<commit_message>
working comms with scorepads and photon
</commit_message>
<xml_diff>
--- a/PHY 252/Applications of Quantum Physics in Electronics.pptx
+++ b/PHY 252/Applications of Quantum Physics in Electronics.pptx
@@ -125,6 +125,11 @@
       </a:defRPr>
     </a:lvl9pPr>
   </p:defaultTextStyle>
+  <p:extLst>
+    <p:ext uri="{EFAFB233-063F-42B5-8137-9DF3F51BA10A}">
+      <p15:sldGuideLst xmlns:p15="http://schemas.microsoft.com/office/powerpoint/2012/main"/>
+    </p:ext>
+  </p:extLst>
 </p:presentation>
 </file>
 
@@ -178,7 +183,7 @@
           <a:noFill/>
           <a:extLst>
             <a:ext uri="{909E8E84-426E-40dd-AFC4-6F175D3DCCD1}">
-              <a14:hiddenFill xmlns:a14="http://schemas.microsoft.com/office/drawing/2010/main" xmlns="">
+              <a14:hiddenFill xmlns="" xmlns:a14="http://schemas.microsoft.com/office/drawing/2010/main">
                 <a:solidFill>
                   <a:srgbClr val="FFFFFF"/>
                 </a:solidFill>
@@ -238,7 +243,7 @@
             </a:ln>
             <a:extLst>
               <a:ext uri="{91240B29-F687-4f45-9708-019B960494DF}">
-                <a14:hiddenLine xmlns:a14="http://schemas.microsoft.com/office/drawing/2010/main" xmlns="" w="9525">
+                <a14:hiddenLine xmlns="" xmlns:a14="http://schemas.microsoft.com/office/drawing/2010/main" w="9525">
                   <a:solidFill>
                     <a:srgbClr val="000000"/>
                   </a:solidFill>
@@ -328,7 +333,7 @@
             </a:ln>
             <a:extLst>
               <a:ext uri="{91240B29-F687-4f45-9708-019B960494DF}">
-                <a14:hiddenLine xmlns:a14="http://schemas.microsoft.com/office/drawing/2010/main" xmlns="" w="9525">
+                <a14:hiddenLine xmlns="" xmlns:a14="http://schemas.microsoft.com/office/drawing/2010/main" w="9525">
                   <a:solidFill>
                     <a:srgbClr val="000000"/>
                   </a:solidFill>
@@ -418,7 +423,7 @@
             </a:ln>
             <a:extLst>
               <a:ext uri="{91240B29-F687-4f45-9708-019B960494DF}">
-                <a14:hiddenLine xmlns:a14="http://schemas.microsoft.com/office/drawing/2010/main" xmlns="" w="9525">
+                <a14:hiddenLine xmlns="" xmlns:a14="http://schemas.microsoft.com/office/drawing/2010/main" w="9525">
                   <a:solidFill>
                     <a:srgbClr val="000000"/>
                   </a:solidFill>
@@ -452,7 +457,7 @@
             </a:ln>
             <a:extLst>
               <a:ext uri="{91240B29-F687-4f45-9708-019B960494DF}">
-                <a14:hiddenLine xmlns:a14="http://schemas.microsoft.com/office/drawing/2010/main" xmlns="" w="9525">
+                <a14:hiddenLine xmlns="" xmlns:a14="http://schemas.microsoft.com/office/drawing/2010/main" w="9525">
                   <a:solidFill>
                     <a:srgbClr val="000000"/>
                   </a:solidFill>
@@ -542,7 +547,7 @@
             </a:ln>
             <a:extLst>
               <a:ext uri="{91240B29-F687-4f45-9708-019B960494DF}">
-                <a14:hiddenLine xmlns:a14="http://schemas.microsoft.com/office/drawing/2010/main" xmlns="" w="9525">
+                <a14:hiddenLine xmlns="" xmlns:a14="http://schemas.microsoft.com/office/drawing/2010/main" w="9525">
                   <a:solidFill>
                     <a:srgbClr val="000000"/>
                   </a:solidFill>
@@ -604,7 +609,7 @@
             </a:ln>
             <a:extLst>
               <a:ext uri="{91240B29-F687-4f45-9708-019B960494DF}">
-                <a14:hiddenLine xmlns:a14="http://schemas.microsoft.com/office/drawing/2010/main" xmlns="" w="9525">
+                <a14:hiddenLine xmlns="" xmlns:a14="http://schemas.microsoft.com/office/drawing/2010/main" w="9525">
                   <a:solidFill>
                     <a:srgbClr val="000000"/>
                   </a:solidFill>
@@ -666,7 +671,7 @@
             </a:ln>
             <a:extLst>
               <a:ext uri="{91240B29-F687-4f45-9708-019B960494DF}">
-                <a14:hiddenLine xmlns:a14="http://schemas.microsoft.com/office/drawing/2010/main" xmlns="" w="9525">
+                <a14:hiddenLine xmlns="" xmlns:a14="http://schemas.microsoft.com/office/drawing/2010/main" w="9525">
                   <a:solidFill>
                     <a:srgbClr val="000000"/>
                   </a:solidFill>
@@ -756,7 +761,7 @@
             </a:ln>
             <a:extLst>
               <a:ext uri="{91240B29-F687-4f45-9708-019B960494DF}">
-                <a14:hiddenLine xmlns:a14="http://schemas.microsoft.com/office/drawing/2010/main" xmlns="" w="9525">
+                <a14:hiddenLine xmlns="" xmlns:a14="http://schemas.microsoft.com/office/drawing/2010/main" w="9525">
                   <a:solidFill>
                     <a:srgbClr val="000000"/>
                   </a:solidFill>
@@ -818,7 +823,7 @@
             </a:ln>
             <a:extLst>
               <a:ext uri="{91240B29-F687-4f45-9708-019B960494DF}">
-                <a14:hiddenLine xmlns:a14="http://schemas.microsoft.com/office/drawing/2010/main" xmlns="" w="9525">
+                <a14:hiddenLine xmlns="" xmlns:a14="http://schemas.microsoft.com/office/drawing/2010/main" w="9525">
                   <a:solidFill>
                     <a:srgbClr val="000000"/>
                   </a:solidFill>
@@ -880,7 +885,7 @@
             </a:ln>
             <a:extLst>
               <a:ext uri="{91240B29-F687-4f45-9708-019B960494DF}">
-                <a14:hiddenLine xmlns:a14="http://schemas.microsoft.com/office/drawing/2010/main" xmlns="" w="9525">
+                <a14:hiddenLine xmlns="" xmlns:a14="http://schemas.microsoft.com/office/drawing/2010/main" w="9525">
                   <a:solidFill>
                     <a:srgbClr val="000000"/>
                   </a:solidFill>
@@ -970,7 +975,7 @@
             </a:ln>
             <a:extLst>
               <a:ext uri="{91240B29-F687-4f45-9708-019B960494DF}">
-                <a14:hiddenLine xmlns:a14="http://schemas.microsoft.com/office/drawing/2010/main" xmlns="" w="9525">
+                <a14:hiddenLine xmlns="" xmlns:a14="http://schemas.microsoft.com/office/drawing/2010/main" w="9525">
                   <a:solidFill>
                     <a:srgbClr val="000000"/>
                   </a:solidFill>
@@ -1060,7 +1065,7 @@
             </a:ln>
             <a:extLst>
               <a:ext uri="{91240B29-F687-4f45-9708-019B960494DF}">
-                <a14:hiddenLine xmlns:a14="http://schemas.microsoft.com/office/drawing/2010/main" xmlns="" w="9525">
+                <a14:hiddenLine xmlns="" xmlns:a14="http://schemas.microsoft.com/office/drawing/2010/main" w="9525">
                   <a:solidFill>
                     <a:srgbClr val="000000"/>
                   </a:solidFill>
@@ -1122,7 +1127,7 @@
             </a:ln>
             <a:extLst>
               <a:ext uri="{91240B29-F687-4f45-9708-019B960494DF}">
-                <a14:hiddenLine xmlns:a14="http://schemas.microsoft.com/office/drawing/2010/main" xmlns="" w="9525">
+                <a14:hiddenLine xmlns="" xmlns:a14="http://schemas.microsoft.com/office/drawing/2010/main" w="9525">
                   <a:solidFill>
                     <a:srgbClr val="000000"/>
                   </a:solidFill>
@@ -1232,7 +1237,7 @@
             </a:ln>
             <a:extLst>
               <a:ext uri="{91240B29-F687-4f45-9708-019B960494DF}">
-                <a14:hiddenLine xmlns:a14="http://schemas.microsoft.com/office/drawing/2010/main" xmlns="" w="9525">
+                <a14:hiddenLine xmlns="" xmlns:a14="http://schemas.microsoft.com/office/drawing/2010/main" w="9525">
                   <a:solidFill>
                     <a:srgbClr val="000000"/>
                   </a:solidFill>
@@ -1294,7 +1299,7 @@
             </a:ln>
             <a:extLst>
               <a:ext uri="{91240B29-F687-4f45-9708-019B960494DF}">
-                <a14:hiddenLine xmlns:a14="http://schemas.microsoft.com/office/drawing/2010/main" xmlns="" w="9525">
+                <a14:hiddenLine xmlns="" xmlns:a14="http://schemas.microsoft.com/office/drawing/2010/main" w="9525">
                   <a:solidFill>
                     <a:srgbClr val="000000"/>
                   </a:solidFill>
@@ -1384,7 +1389,7 @@
             </a:ln>
             <a:extLst>
               <a:ext uri="{91240B29-F687-4f45-9708-019B960494DF}">
-                <a14:hiddenLine xmlns:a14="http://schemas.microsoft.com/office/drawing/2010/main" xmlns="" w="9525">
+                <a14:hiddenLine xmlns="" xmlns:a14="http://schemas.microsoft.com/office/drawing/2010/main" w="9525">
                   <a:solidFill>
                     <a:srgbClr val="000000"/>
                   </a:solidFill>
@@ -1474,7 +1479,7 @@
             </a:ln>
             <a:extLst>
               <a:ext uri="{91240B29-F687-4f45-9708-019B960494DF}">
-                <a14:hiddenLine xmlns:a14="http://schemas.microsoft.com/office/drawing/2010/main" xmlns="" w="9525">
+                <a14:hiddenLine xmlns="" xmlns:a14="http://schemas.microsoft.com/office/drawing/2010/main" w="9525">
                   <a:solidFill>
                     <a:srgbClr val="000000"/>
                   </a:solidFill>
@@ -1536,7 +1541,7 @@
             </a:ln>
             <a:extLst>
               <a:ext uri="{91240B29-F687-4f45-9708-019B960494DF}">
-                <a14:hiddenLine xmlns:a14="http://schemas.microsoft.com/office/drawing/2010/main" xmlns="" w="9525">
+                <a14:hiddenLine xmlns="" xmlns:a14="http://schemas.microsoft.com/office/drawing/2010/main" w="9525">
                   <a:solidFill>
                     <a:srgbClr val="000000"/>
                   </a:solidFill>
@@ -1626,7 +1631,7 @@
             </a:ln>
             <a:extLst>
               <a:ext uri="{91240B29-F687-4f45-9708-019B960494DF}">
-                <a14:hiddenLine xmlns:a14="http://schemas.microsoft.com/office/drawing/2010/main" xmlns="" w="9525">
+                <a14:hiddenLine xmlns="" xmlns:a14="http://schemas.microsoft.com/office/drawing/2010/main" w="9525">
                   <a:solidFill>
                     <a:srgbClr val="000000"/>
                   </a:solidFill>
@@ -1716,7 +1721,7 @@
             </a:ln>
             <a:extLst>
               <a:ext uri="{91240B29-F687-4f45-9708-019B960494DF}">
-                <a14:hiddenLine xmlns:a14="http://schemas.microsoft.com/office/drawing/2010/main" xmlns="" w="9525">
+                <a14:hiddenLine xmlns="" xmlns:a14="http://schemas.microsoft.com/office/drawing/2010/main" w="9525">
                   <a:solidFill>
                     <a:srgbClr val="000000"/>
                   </a:solidFill>
@@ -1772,7 +1777,7 @@
             </a:ln>
             <a:extLst>
               <a:ext uri="{91240B29-F687-4f45-9708-019B960494DF}">
-                <a14:hiddenLine xmlns:a14="http://schemas.microsoft.com/office/drawing/2010/main" xmlns="" w="9525">
+                <a14:hiddenLine xmlns="" xmlns:a14="http://schemas.microsoft.com/office/drawing/2010/main" w="9525">
                   <a:solidFill>
                     <a:srgbClr val="000000"/>
                   </a:solidFill>
@@ -1862,7 +1867,7 @@
             </a:ln>
             <a:extLst>
               <a:ext uri="{91240B29-F687-4f45-9708-019B960494DF}">
-                <a14:hiddenLine xmlns:a14="http://schemas.microsoft.com/office/drawing/2010/main" xmlns="" w="9525">
+                <a14:hiddenLine xmlns="" xmlns:a14="http://schemas.microsoft.com/office/drawing/2010/main" w="9525">
                   <a:solidFill>
                     <a:srgbClr val="000000"/>
                   </a:solidFill>
@@ -1918,7 +1923,7 @@
             </a:ln>
             <a:extLst>
               <a:ext uri="{91240B29-F687-4f45-9708-019B960494DF}">
-                <a14:hiddenLine xmlns:a14="http://schemas.microsoft.com/office/drawing/2010/main" xmlns="" w="9525">
+                <a14:hiddenLine xmlns="" xmlns:a14="http://schemas.microsoft.com/office/drawing/2010/main" w="9525">
                   <a:solidFill>
                     <a:srgbClr val="000000"/>
                   </a:solidFill>
@@ -2008,7 +2013,7 @@
             </a:ln>
             <a:extLst>
               <a:ext uri="{91240B29-F687-4f45-9708-019B960494DF}">
-                <a14:hiddenLine xmlns:a14="http://schemas.microsoft.com/office/drawing/2010/main" xmlns="" w="9525">
+                <a14:hiddenLine xmlns="" xmlns:a14="http://schemas.microsoft.com/office/drawing/2010/main" w="9525">
                   <a:solidFill>
                     <a:srgbClr val="000000"/>
                   </a:solidFill>
@@ -2076,7 +2081,7 @@
             </a:ln>
             <a:extLst>
               <a:ext uri="{91240B29-F687-4f45-9708-019B960494DF}">
-                <a14:hiddenLine xmlns:a14="http://schemas.microsoft.com/office/drawing/2010/main" xmlns="" w="9525">
+                <a14:hiddenLine xmlns="" xmlns:a14="http://schemas.microsoft.com/office/drawing/2010/main" w="9525">
                   <a:solidFill>
                     <a:srgbClr val="000000"/>
                   </a:solidFill>
@@ -2166,7 +2171,7 @@
             </a:ln>
             <a:extLst>
               <a:ext uri="{91240B29-F687-4f45-9708-019B960494DF}">
-                <a14:hiddenLine xmlns:a14="http://schemas.microsoft.com/office/drawing/2010/main" xmlns="" w="9525">
+                <a14:hiddenLine xmlns="" xmlns:a14="http://schemas.microsoft.com/office/drawing/2010/main" w="9525">
                   <a:solidFill>
                     <a:srgbClr val="000000"/>
                   </a:solidFill>
@@ -2234,7 +2239,7 @@
             </a:ln>
             <a:extLst>
               <a:ext uri="{91240B29-F687-4f45-9708-019B960494DF}">
-                <a14:hiddenLine xmlns:a14="http://schemas.microsoft.com/office/drawing/2010/main" xmlns="" w="9525">
+                <a14:hiddenLine xmlns="" xmlns:a14="http://schemas.microsoft.com/office/drawing/2010/main" w="9525">
                   <a:solidFill>
                     <a:srgbClr val="000000"/>
                   </a:solidFill>
@@ -2324,7 +2329,7 @@
             </a:ln>
             <a:extLst>
               <a:ext uri="{91240B29-F687-4f45-9708-019B960494DF}">
-                <a14:hiddenLine xmlns:a14="http://schemas.microsoft.com/office/drawing/2010/main" xmlns="" w="9525">
+                <a14:hiddenLine xmlns="" xmlns:a14="http://schemas.microsoft.com/office/drawing/2010/main" w="9525">
                   <a:solidFill>
                     <a:srgbClr val="000000"/>
                   </a:solidFill>
@@ -2358,7 +2363,7 @@
             </a:ln>
             <a:extLst>
               <a:ext uri="{91240B29-F687-4f45-9708-019B960494DF}">
-                <a14:hiddenLine xmlns:a14="http://schemas.microsoft.com/office/drawing/2010/main" xmlns="" w="9525">
+                <a14:hiddenLine xmlns="" xmlns:a14="http://schemas.microsoft.com/office/drawing/2010/main" w="9525">
                   <a:solidFill>
                     <a:srgbClr val="000000"/>
                   </a:solidFill>
@@ -2448,7 +2453,7 @@
             </a:ln>
             <a:extLst>
               <a:ext uri="{91240B29-F687-4f45-9708-019B960494DF}">
-                <a14:hiddenLine xmlns:a14="http://schemas.microsoft.com/office/drawing/2010/main" xmlns="" w="9525">
+                <a14:hiddenLine xmlns="" xmlns:a14="http://schemas.microsoft.com/office/drawing/2010/main" w="9525">
                   <a:solidFill>
                     <a:srgbClr val="000000"/>
                   </a:solidFill>
@@ -2510,7 +2515,7 @@
             </a:ln>
             <a:extLst>
               <a:ext uri="{91240B29-F687-4f45-9708-019B960494DF}">
-                <a14:hiddenLine xmlns:a14="http://schemas.microsoft.com/office/drawing/2010/main" xmlns="" w="9525">
+                <a14:hiddenLine xmlns="" xmlns:a14="http://schemas.microsoft.com/office/drawing/2010/main" w="9525">
                   <a:solidFill>
                     <a:srgbClr val="000000"/>
                   </a:solidFill>
@@ -2572,7 +2577,7 @@
             </a:ln>
             <a:extLst>
               <a:ext uri="{91240B29-F687-4f45-9708-019B960494DF}">
-                <a14:hiddenLine xmlns:a14="http://schemas.microsoft.com/office/drawing/2010/main" xmlns="" w="9525">
+                <a14:hiddenLine xmlns="" xmlns:a14="http://schemas.microsoft.com/office/drawing/2010/main" w="9525">
                   <a:solidFill>
                     <a:srgbClr val="000000"/>
                   </a:solidFill>
@@ -2662,7 +2667,7 @@
             </a:ln>
             <a:extLst>
               <a:ext uri="{91240B29-F687-4f45-9708-019B960494DF}">
-                <a14:hiddenLine xmlns:a14="http://schemas.microsoft.com/office/drawing/2010/main" xmlns="" w="9525">
+                <a14:hiddenLine xmlns="" xmlns:a14="http://schemas.microsoft.com/office/drawing/2010/main" w="9525">
                   <a:solidFill>
                     <a:srgbClr val="000000"/>
                   </a:solidFill>
@@ -2730,7 +2735,7 @@
             </a:ln>
             <a:extLst>
               <a:ext uri="{91240B29-F687-4f45-9708-019B960494DF}">
-                <a14:hiddenLine xmlns:a14="http://schemas.microsoft.com/office/drawing/2010/main" xmlns="" w="9525">
+                <a14:hiddenLine xmlns="" xmlns:a14="http://schemas.microsoft.com/office/drawing/2010/main" w="9525">
                   <a:solidFill>
                     <a:srgbClr val="000000"/>
                   </a:solidFill>
@@ -2792,7 +2797,7 @@
             </a:ln>
             <a:extLst>
               <a:ext uri="{91240B29-F687-4f45-9708-019B960494DF}">
-                <a14:hiddenLine xmlns:a14="http://schemas.microsoft.com/office/drawing/2010/main" xmlns="" w="9525">
+                <a14:hiddenLine xmlns="" xmlns:a14="http://schemas.microsoft.com/office/drawing/2010/main" w="9525">
                   <a:solidFill>
                     <a:srgbClr val="000000"/>
                   </a:solidFill>
@@ -2882,7 +2887,7 @@
             </a:ln>
             <a:extLst>
               <a:ext uri="{91240B29-F687-4f45-9708-019B960494DF}">
-                <a14:hiddenLine xmlns:a14="http://schemas.microsoft.com/office/drawing/2010/main" xmlns="" w="9525">
+                <a14:hiddenLine xmlns="" xmlns:a14="http://schemas.microsoft.com/office/drawing/2010/main" w="9525">
                   <a:solidFill>
                     <a:srgbClr val="000000"/>
                   </a:solidFill>
@@ -2944,7 +2949,7 @@
             </a:ln>
             <a:extLst>
               <a:ext uri="{91240B29-F687-4f45-9708-019B960494DF}">
-                <a14:hiddenLine xmlns:a14="http://schemas.microsoft.com/office/drawing/2010/main" xmlns="" w="9525">
+                <a14:hiddenLine xmlns="" xmlns:a14="http://schemas.microsoft.com/office/drawing/2010/main" w="9525">
                   <a:solidFill>
                     <a:srgbClr val="000000"/>
                   </a:solidFill>
@@ -3034,7 +3039,7 @@
             </a:ln>
             <a:extLst>
               <a:ext uri="{91240B29-F687-4f45-9708-019B960494DF}">
-                <a14:hiddenLine xmlns:a14="http://schemas.microsoft.com/office/drawing/2010/main" xmlns="" w="9525">
+                <a14:hiddenLine xmlns="" xmlns:a14="http://schemas.microsoft.com/office/drawing/2010/main" w="9525">
                   <a:solidFill>
                     <a:srgbClr val="000000"/>
                   </a:solidFill>
@@ -3096,7 +3101,7 @@
             </a:ln>
             <a:extLst>
               <a:ext uri="{91240B29-F687-4f45-9708-019B960494DF}">
-                <a14:hiddenLine xmlns:a14="http://schemas.microsoft.com/office/drawing/2010/main" xmlns="" w="9525">
+                <a14:hiddenLine xmlns="" xmlns:a14="http://schemas.microsoft.com/office/drawing/2010/main" w="9525">
                   <a:solidFill>
                     <a:srgbClr val="000000"/>
                   </a:solidFill>
@@ -3186,7 +3191,7 @@
             </a:ln>
             <a:extLst>
               <a:ext uri="{91240B29-F687-4f45-9708-019B960494DF}">
-                <a14:hiddenLine xmlns:a14="http://schemas.microsoft.com/office/drawing/2010/main" xmlns="" w="9525">
+                <a14:hiddenLine xmlns="" xmlns:a14="http://schemas.microsoft.com/office/drawing/2010/main" w="9525">
                   <a:solidFill>
                     <a:srgbClr val="000000"/>
                   </a:solidFill>
@@ -3220,7 +3225,7 @@
             </a:ln>
             <a:extLst>
               <a:ext uri="{91240B29-F687-4f45-9708-019B960494DF}">
-                <a14:hiddenLine xmlns:a14="http://schemas.microsoft.com/office/drawing/2010/main" xmlns="" w="9525">
+                <a14:hiddenLine xmlns="" xmlns:a14="http://schemas.microsoft.com/office/drawing/2010/main" w="9525">
                   <a:solidFill>
                     <a:srgbClr val="000000"/>
                   </a:solidFill>
@@ -3285,7 +3290,7 @@
             </a:ln>
             <a:extLst>
               <a:ext uri="{91240B29-F687-4f45-9708-019B960494DF}">
-                <a14:hiddenLine xmlns:a14="http://schemas.microsoft.com/office/drawing/2010/main" xmlns="" w="9525">
+                <a14:hiddenLine xmlns="" xmlns:a14="http://schemas.microsoft.com/office/drawing/2010/main" w="9525">
                   <a:solidFill>
                     <a:srgbClr val="000000"/>
                   </a:solidFill>
@@ -3375,7 +3380,7 @@
             </a:ln>
             <a:extLst>
               <a:ext uri="{91240B29-F687-4f45-9708-019B960494DF}">
-                <a14:hiddenLine xmlns:a14="http://schemas.microsoft.com/office/drawing/2010/main" xmlns="" w="9525">
+                <a14:hiddenLine xmlns="" xmlns:a14="http://schemas.microsoft.com/office/drawing/2010/main" w="9525">
                   <a:solidFill>
                     <a:srgbClr val="000000"/>
                   </a:solidFill>
@@ -3437,7 +3442,7 @@
             </a:ln>
             <a:extLst>
               <a:ext uri="{91240B29-F687-4f45-9708-019B960494DF}">
-                <a14:hiddenLine xmlns:a14="http://schemas.microsoft.com/office/drawing/2010/main" xmlns="" w="9525">
+                <a14:hiddenLine xmlns="" xmlns:a14="http://schemas.microsoft.com/office/drawing/2010/main" w="9525">
                   <a:solidFill>
                     <a:srgbClr val="000000"/>
                   </a:solidFill>
@@ -3527,7 +3532,7 @@
             </a:ln>
             <a:extLst>
               <a:ext uri="{91240B29-F687-4f45-9708-019B960494DF}">
-                <a14:hiddenLine xmlns:a14="http://schemas.microsoft.com/office/drawing/2010/main" xmlns="" w="9525">
+                <a14:hiddenLine xmlns="" xmlns:a14="http://schemas.microsoft.com/office/drawing/2010/main" w="9525">
                   <a:solidFill>
                     <a:srgbClr val="000000"/>
                   </a:solidFill>
@@ -3617,7 +3622,7 @@
             </a:ln>
             <a:extLst>
               <a:ext uri="{91240B29-F687-4f45-9708-019B960494DF}">
-                <a14:hiddenLine xmlns:a14="http://schemas.microsoft.com/office/drawing/2010/main" xmlns="" w="9525">
+                <a14:hiddenLine xmlns="" xmlns:a14="http://schemas.microsoft.com/office/drawing/2010/main" w="9525">
                   <a:solidFill>
                     <a:srgbClr val="000000"/>
                   </a:solidFill>
@@ -3682,7 +3687,7 @@
             </a:ln>
             <a:extLst>
               <a:ext uri="{91240B29-F687-4f45-9708-019B960494DF}">
-                <a14:hiddenLine xmlns:a14="http://schemas.microsoft.com/office/drawing/2010/main" xmlns="" w="9525">
+                <a14:hiddenLine xmlns="" xmlns:a14="http://schemas.microsoft.com/office/drawing/2010/main" w="9525">
                   <a:solidFill>
                     <a:srgbClr val="000000"/>
                   </a:solidFill>
@@ -3744,7 +3749,7 @@
             </a:ln>
             <a:extLst>
               <a:ext uri="{91240B29-F687-4f45-9708-019B960494DF}">
-                <a14:hiddenLine xmlns:a14="http://schemas.microsoft.com/office/drawing/2010/main" xmlns="" w="9525">
+                <a14:hiddenLine xmlns="" xmlns:a14="http://schemas.microsoft.com/office/drawing/2010/main" w="9525">
                   <a:solidFill>
                     <a:srgbClr val="000000"/>
                   </a:solidFill>
@@ -3834,7 +3839,7 @@
             </a:ln>
             <a:extLst>
               <a:ext uri="{91240B29-F687-4f45-9708-019B960494DF}">
-                <a14:hiddenLine xmlns:a14="http://schemas.microsoft.com/office/drawing/2010/main" xmlns="" w="9525">
+                <a14:hiddenLine xmlns="" xmlns:a14="http://schemas.microsoft.com/office/drawing/2010/main" w="9525">
                   <a:solidFill>
                     <a:srgbClr val="000000"/>
                   </a:solidFill>
@@ -3924,7 +3929,7 @@
             </a:ln>
             <a:extLst>
               <a:ext uri="{91240B29-F687-4f45-9708-019B960494DF}">
-                <a14:hiddenLine xmlns:a14="http://schemas.microsoft.com/office/drawing/2010/main" xmlns="" w="9525">
+                <a14:hiddenLine xmlns="" xmlns:a14="http://schemas.microsoft.com/office/drawing/2010/main" w="9525">
                   <a:solidFill>
                     <a:srgbClr val="000000"/>
                   </a:solidFill>
@@ -3986,7 +3991,7 @@
             </a:ln>
             <a:extLst>
               <a:ext uri="{91240B29-F687-4f45-9708-019B960494DF}">
-                <a14:hiddenLine xmlns:a14="http://schemas.microsoft.com/office/drawing/2010/main" xmlns="" w="9525">
+                <a14:hiddenLine xmlns="" xmlns:a14="http://schemas.microsoft.com/office/drawing/2010/main" w="9525">
                   <a:solidFill>
                     <a:srgbClr val="000000"/>
                   </a:solidFill>
@@ -4106,7 +4111,7 @@
             </a:ln>
             <a:extLst>
               <a:ext uri="{91240B29-F687-4f45-9708-019B960494DF}">
-                <a14:hiddenLine xmlns:a14="http://schemas.microsoft.com/office/drawing/2010/main" xmlns="" w="9525">
+                <a14:hiddenLine xmlns="" xmlns:a14="http://schemas.microsoft.com/office/drawing/2010/main" w="9525">
                   <a:solidFill>
                     <a:srgbClr val="000000"/>
                   </a:solidFill>
@@ -4174,7 +4179,7 @@
             </a:ln>
             <a:extLst>
               <a:ext uri="{91240B29-F687-4f45-9708-019B960494DF}">
-                <a14:hiddenLine xmlns:a14="http://schemas.microsoft.com/office/drawing/2010/main" xmlns="" w="9525">
+                <a14:hiddenLine xmlns="" xmlns:a14="http://schemas.microsoft.com/office/drawing/2010/main" w="9525">
                   <a:solidFill>
                     <a:srgbClr val="000000"/>
                   </a:solidFill>
@@ -4264,7 +4269,7 @@
             </a:ln>
             <a:extLst>
               <a:ext uri="{91240B29-F687-4f45-9708-019B960494DF}">
-                <a14:hiddenLine xmlns:a14="http://schemas.microsoft.com/office/drawing/2010/main" xmlns="" w="9525">
+                <a14:hiddenLine xmlns="" xmlns:a14="http://schemas.microsoft.com/office/drawing/2010/main" w="9525">
                   <a:solidFill>
                     <a:srgbClr val="000000"/>
                   </a:solidFill>
@@ -4404,7 +4409,7 @@
           <a:p>
             <a:fld id="{48A87A34-81AB-432B-8DAE-1953F412C126}" type="datetimeFigureOut">
               <a:rPr lang="en-US" dirty="0"/>
-              <a:t>4/22/2018</a:t>
+              <a:t>4/23/2018</a:t>
             </a:fld>
             <a:endParaRPr lang="en-US" dirty="0"/>
           </a:p>
@@ -4666,7 +4671,7 @@
           <a:p>
             <a:fld id="{48A87A34-81AB-432B-8DAE-1953F412C126}" type="datetimeFigureOut">
               <a:rPr lang="en-US" dirty="0"/>
-              <a:t>4/22/2018</a:t>
+              <a:t>4/23/2018</a:t>
             </a:fld>
             <a:endParaRPr lang="en-US" dirty="0"/>
           </a:p>
@@ -4857,7 +4862,7 @@
           <a:p>
             <a:fld id="{48A87A34-81AB-432B-8DAE-1953F412C126}" type="datetimeFigureOut">
               <a:rPr lang="en-US" dirty="0"/>
-              <a:t>4/22/2018</a:t>
+              <a:t>4/23/2018</a:t>
             </a:fld>
             <a:endParaRPr lang="en-US" dirty="0"/>
           </a:p>
@@ -5115,7 +5120,7 @@
           <a:p>
             <a:fld id="{48A87A34-81AB-432B-8DAE-1953F412C126}" type="datetimeFigureOut">
               <a:rPr lang="en-US" dirty="0"/>
-              <a:t>4/22/2018</a:t>
+              <a:t>4/23/2018</a:t>
             </a:fld>
             <a:endParaRPr lang="en-US" dirty="0"/>
           </a:p>
@@ -5544,7 +5549,7 @@
           <a:p>
             <a:fld id="{48A87A34-81AB-432B-8DAE-1953F412C126}" type="datetimeFigureOut">
               <a:rPr lang="en-US" dirty="0"/>
-              <a:t>4/22/2018</a:t>
+              <a:t>4/23/2018</a:t>
             </a:fld>
             <a:endParaRPr lang="en-US" dirty="0"/>
           </a:p>
@@ -6085,7 +6090,7 @@
           <a:p>
             <a:fld id="{48A87A34-81AB-432B-8DAE-1953F412C126}" type="datetimeFigureOut">
               <a:rPr lang="en-US" dirty="0"/>
-              <a:t>4/22/2018</a:t>
+              <a:t>4/23/2018</a:t>
             </a:fld>
             <a:endParaRPr lang="en-US" dirty="0"/>
           </a:p>
@@ -6800,7 +6805,7 @@
           <a:p>
             <a:fld id="{48A87A34-81AB-432B-8DAE-1953F412C126}" type="datetimeFigureOut">
               <a:rPr lang="en-US" dirty="0"/>
-              <a:t>4/22/2018</a:t>
+              <a:t>4/23/2018</a:t>
             </a:fld>
             <a:endParaRPr lang="en-US" dirty="0"/>
           </a:p>
@@ -6965,7 +6970,7 @@
           <a:p>
             <a:fld id="{48A87A34-81AB-432B-8DAE-1953F412C126}" type="datetimeFigureOut">
               <a:rPr lang="en-US" dirty="0"/>
-              <a:t>4/22/2018</a:t>
+              <a:t>4/23/2018</a:t>
             </a:fld>
             <a:endParaRPr lang="en-US" dirty="0"/>
           </a:p>
@@ -7140,7 +7145,7 @@
           <a:p>
             <a:fld id="{48A87A34-81AB-432B-8DAE-1953F412C126}" type="datetimeFigureOut">
               <a:rPr lang="en-US" dirty="0"/>
-              <a:t>4/22/2018</a:t>
+              <a:t>4/23/2018</a:t>
             </a:fld>
             <a:endParaRPr lang="en-US" dirty="0"/>
           </a:p>
@@ -7305,7 +7310,7 @@
           <a:p>
             <a:fld id="{48A87A34-81AB-432B-8DAE-1953F412C126}" type="datetimeFigureOut">
               <a:rPr lang="en-US" dirty="0"/>
-              <a:t>4/22/2018</a:t>
+              <a:t>4/23/2018</a:t>
             </a:fld>
             <a:endParaRPr lang="en-US" dirty="0"/>
           </a:p>
@@ -7550,7 +7555,7 @@
           <a:p>
             <a:fld id="{48A87A34-81AB-432B-8DAE-1953F412C126}" type="datetimeFigureOut">
               <a:rPr lang="en-US" dirty="0"/>
-              <a:t>4/22/2018</a:t>
+              <a:t>4/23/2018</a:t>
             </a:fld>
             <a:endParaRPr lang="en-US" dirty="0"/>
           </a:p>
@@ -7777,7 +7782,7 @@
           <a:p>
             <a:fld id="{48A87A34-81AB-432B-8DAE-1953F412C126}" type="datetimeFigureOut">
               <a:rPr lang="en-US" dirty="0"/>
-              <a:t>4/22/2018</a:t>
+              <a:t>4/23/2018</a:t>
             </a:fld>
             <a:endParaRPr lang="en-US" dirty="0"/>
           </a:p>
@@ -8153,7 +8158,7 @@
           <a:p>
             <a:fld id="{48A87A34-81AB-432B-8DAE-1953F412C126}" type="datetimeFigureOut">
               <a:rPr lang="en-US" dirty="0"/>
-              <a:t>4/22/2018</a:t>
+              <a:t>4/23/2018</a:t>
             </a:fld>
             <a:endParaRPr lang="en-US" dirty="0"/>
           </a:p>
@@ -8266,7 +8271,7 @@
           <a:p>
             <a:fld id="{48A87A34-81AB-432B-8DAE-1953F412C126}" type="datetimeFigureOut">
               <a:rPr lang="en-US" dirty="0"/>
-              <a:t>4/22/2018</a:t>
+              <a:t>4/23/2018</a:t>
             </a:fld>
             <a:endParaRPr lang="en-US" dirty="0"/>
           </a:p>
@@ -8356,7 +8361,7 @@
           <a:p>
             <a:fld id="{48A87A34-81AB-432B-8DAE-1953F412C126}" type="datetimeFigureOut">
               <a:rPr lang="en-US" dirty="0"/>
-              <a:t>4/22/2018</a:t>
+              <a:t>4/23/2018</a:t>
             </a:fld>
             <a:endParaRPr lang="en-US" dirty="0"/>
           </a:p>
@@ -8600,7 +8605,7 @@
           <a:p>
             <a:fld id="{48A87A34-81AB-432B-8DAE-1953F412C126}" type="datetimeFigureOut">
               <a:rPr lang="en-US" dirty="0"/>
-              <a:t>4/22/2018</a:t>
+              <a:t>4/23/2018</a:t>
             </a:fld>
             <a:endParaRPr lang="en-US" dirty="0"/>
           </a:p>
@@ -8875,7 +8880,7 @@
           <a:p>
             <a:fld id="{48A87A34-81AB-432B-8DAE-1953F412C126}" type="datetimeFigureOut">
               <a:rPr lang="en-US" dirty="0"/>
-              <a:t>4/22/2018</a:t>
+              <a:t>4/23/2018</a:t>
             </a:fld>
             <a:endParaRPr lang="en-US" dirty="0"/>
           </a:p>
@@ -8986,7 +8991,7 @@
           <a:noFill/>
           <a:extLst>
             <a:ext uri="{909E8E84-426E-40dd-AFC4-6F175D3DCCD1}">
-              <a14:hiddenFill xmlns:a14="http://schemas.microsoft.com/office/drawing/2010/main" xmlns="">
+              <a14:hiddenFill xmlns="" xmlns:a14="http://schemas.microsoft.com/office/drawing/2010/main">
                 <a:solidFill>
                   <a:srgbClr val="FFFFFF"/>
                 </a:solidFill>
@@ -9060,7 +9065,7 @@
               </a:ln>
               <a:extLst>
                 <a:ext uri="{91240B29-F687-4f45-9708-019B960494DF}">
-                  <a14:hiddenLine xmlns:a14="http://schemas.microsoft.com/office/drawing/2010/main" xmlns="" w="9525">
+                  <a14:hiddenLine xmlns="" xmlns:a14="http://schemas.microsoft.com/office/drawing/2010/main" w="9525">
                     <a:solidFill>
                       <a:srgbClr val="000000"/>
                     </a:solidFill>
@@ -9150,7 +9155,7 @@
               </a:ln>
               <a:extLst>
                 <a:ext uri="{91240B29-F687-4f45-9708-019B960494DF}">
-                  <a14:hiddenLine xmlns:a14="http://schemas.microsoft.com/office/drawing/2010/main" xmlns="" w="9525">
+                  <a14:hiddenLine xmlns="" xmlns:a14="http://schemas.microsoft.com/office/drawing/2010/main" w="9525">
                     <a:solidFill>
                       <a:srgbClr val="000000"/>
                     </a:solidFill>
@@ -9240,7 +9245,7 @@
               </a:ln>
               <a:extLst>
                 <a:ext uri="{91240B29-F687-4f45-9708-019B960494DF}">
-                  <a14:hiddenLine xmlns:a14="http://schemas.microsoft.com/office/drawing/2010/main" xmlns="" w="9525">
+                  <a14:hiddenLine xmlns="" xmlns:a14="http://schemas.microsoft.com/office/drawing/2010/main" w="9525">
                     <a:solidFill>
                       <a:srgbClr val="000000"/>
                     </a:solidFill>
@@ -9302,7 +9307,7 @@
               </a:ln>
               <a:extLst>
                 <a:ext uri="{91240B29-F687-4f45-9708-019B960494DF}">
-                  <a14:hiddenLine xmlns:a14="http://schemas.microsoft.com/office/drawing/2010/main" xmlns="" w="9525">
+                  <a14:hiddenLine xmlns="" xmlns:a14="http://schemas.microsoft.com/office/drawing/2010/main" w="9525">
                     <a:solidFill>
                       <a:srgbClr val="000000"/>
                     </a:solidFill>
@@ -9392,7 +9397,7 @@
               </a:ln>
               <a:extLst>
                 <a:ext uri="{91240B29-F687-4f45-9708-019B960494DF}">
-                  <a14:hiddenLine xmlns:a14="http://schemas.microsoft.com/office/drawing/2010/main" xmlns="" w="9525">
+                  <a14:hiddenLine xmlns="" xmlns:a14="http://schemas.microsoft.com/office/drawing/2010/main" w="9525">
                     <a:solidFill>
                       <a:srgbClr val="000000"/>
                     </a:solidFill>
@@ -9454,7 +9459,7 @@
               </a:ln>
               <a:extLst>
                 <a:ext uri="{91240B29-F687-4f45-9708-019B960494DF}">
-                  <a14:hiddenLine xmlns:a14="http://schemas.microsoft.com/office/drawing/2010/main" xmlns="" w="9525">
+                  <a14:hiddenLine xmlns="" xmlns:a14="http://schemas.microsoft.com/office/drawing/2010/main" w="9525">
                     <a:solidFill>
                       <a:srgbClr val="000000"/>
                     </a:solidFill>
@@ -9516,7 +9521,7 @@
               </a:ln>
               <a:extLst>
                 <a:ext uri="{91240B29-F687-4f45-9708-019B960494DF}">
-                  <a14:hiddenLine xmlns:a14="http://schemas.microsoft.com/office/drawing/2010/main" xmlns="" w="9525">
+                  <a14:hiddenLine xmlns="" xmlns:a14="http://schemas.microsoft.com/office/drawing/2010/main" w="9525">
                     <a:solidFill>
                       <a:srgbClr val="000000"/>
                     </a:solidFill>
@@ -9606,7 +9611,7 @@
               </a:ln>
               <a:extLst>
                 <a:ext uri="{91240B29-F687-4f45-9708-019B960494DF}">
-                  <a14:hiddenLine xmlns:a14="http://schemas.microsoft.com/office/drawing/2010/main" xmlns="" w="9525">
+                  <a14:hiddenLine xmlns="" xmlns:a14="http://schemas.microsoft.com/office/drawing/2010/main" w="9525">
                     <a:solidFill>
                       <a:srgbClr val="000000"/>
                     </a:solidFill>
@@ -9696,7 +9701,7 @@
               </a:ln>
               <a:extLst>
                 <a:ext uri="{91240B29-F687-4f45-9708-019B960494DF}">
-                  <a14:hiddenLine xmlns:a14="http://schemas.microsoft.com/office/drawing/2010/main" xmlns="" w="9525">
+                  <a14:hiddenLine xmlns="" xmlns:a14="http://schemas.microsoft.com/office/drawing/2010/main" w="9525">
                     <a:solidFill>
                       <a:srgbClr val="000000"/>
                     </a:solidFill>
@@ -9758,7 +9763,7 @@
               </a:ln>
               <a:extLst>
                 <a:ext uri="{91240B29-F687-4f45-9708-019B960494DF}">
-                  <a14:hiddenLine xmlns:a14="http://schemas.microsoft.com/office/drawing/2010/main" xmlns="" w="9525">
+                  <a14:hiddenLine xmlns="" xmlns:a14="http://schemas.microsoft.com/office/drawing/2010/main" w="9525">
                     <a:solidFill>
                       <a:srgbClr val="000000"/>
                     </a:solidFill>
@@ -9868,7 +9873,7 @@
               </a:ln>
               <a:extLst>
                 <a:ext uri="{91240B29-F687-4f45-9708-019B960494DF}">
-                  <a14:hiddenLine xmlns:a14="http://schemas.microsoft.com/office/drawing/2010/main" xmlns="" w="9525">
+                  <a14:hiddenLine xmlns="" xmlns:a14="http://schemas.microsoft.com/office/drawing/2010/main" w="9525">
                     <a:solidFill>
                       <a:srgbClr val="000000"/>
                     </a:solidFill>
@@ -9952,7 +9957,7 @@
               </a:ln>
               <a:extLst>
                 <a:ext uri="{91240B29-F687-4f45-9708-019B960494DF}">
-                  <a14:hiddenLine xmlns:a14="http://schemas.microsoft.com/office/drawing/2010/main" xmlns="" w="9525">
+                  <a14:hiddenLine xmlns="" xmlns:a14="http://schemas.microsoft.com/office/drawing/2010/main" w="9525">
                     <a:solidFill>
                       <a:srgbClr val="000000"/>
                     </a:solidFill>
@@ -10014,7 +10019,7 @@
               </a:ln>
               <a:extLst>
                 <a:ext uri="{91240B29-F687-4f45-9708-019B960494DF}">
-                  <a14:hiddenLine xmlns:a14="http://schemas.microsoft.com/office/drawing/2010/main" xmlns="" w="9525">
+                  <a14:hiddenLine xmlns="" xmlns:a14="http://schemas.microsoft.com/office/drawing/2010/main" w="9525">
                     <a:solidFill>
                       <a:srgbClr val="000000"/>
                     </a:solidFill>
@@ -10076,7 +10081,7 @@
               </a:ln>
               <a:extLst>
                 <a:ext uri="{91240B29-F687-4f45-9708-019B960494DF}">
-                  <a14:hiddenLine xmlns:a14="http://schemas.microsoft.com/office/drawing/2010/main" xmlns="" w="9525">
+                  <a14:hiddenLine xmlns="" xmlns:a14="http://schemas.microsoft.com/office/drawing/2010/main" w="9525">
                     <a:solidFill>
                       <a:srgbClr val="000000"/>
                     </a:solidFill>
@@ -10166,7 +10171,7 @@
               </a:ln>
               <a:extLst>
                 <a:ext uri="{91240B29-F687-4f45-9708-019B960494DF}">
-                  <a14:hiddenLine xmlns:a14="http://schemas.microsoft.com/office/drawing/2010/main" xmlns="" w="9525">
+                  <a14:hiddenLine xmlns="" xmlns:a14="http://schemas.microsoft.com/office/drawing/2010/main" w="9525">
                     <a:solidFill>
                       <a:srgbClr val="000000"/>
                     </a:solidFill>
@@ -10200,7 +10205,7 @@
               </a:ln>
               <a:extLst>
                 <a:ext uri="{91240B29-F687-4f45-9708-019B960494DF}">
-                  <a14:hiddenLine xmlns:a14="http://schemas.microsoft.com/office/drawing/2010/main" xmlns="" w="9525">
+                  <a14:hiddenLine xmlns="" xmlns:a14="http://schemas.microsoft.com/office/drawing/2010/main" w="9525">
                     <a:solidFill>
                       <a:srgbClr val="000000"/>
                     </a:solidFill>
@@ -10265,7 +10270,7 @@
               </a:ln>
               <a:extLst>
                 <a:ext uri="{91240B29-F687-4f45-9708-019B960494DF}">
-                  <a14:hiddenLine xmlns:a14="http://schemas.microsoft.com/office/drawing/2010/main" xmlns="" w="9525">
+                  <a14:hiddenLine xmlns="" xmlns:a14="http://schemas.microsoft.com/office/drawing/2010/main" w="9525">
                     <a:solidFill>
                       <a:srgbClr val="000000"/>
                     </a:solidFill>
@@ -10355,7 +10360,7 @@
               </a:ln>
               <a:extLst>
                 <a:ext uri="{91240B29-F687-4f45-9708-019B960494DF}">
-                  <a14:hiddenLine xmlns:a14="http://schemas.microsoft.com/office/drawing/2010/main" xmlns="" w="9525">
+                  <a14:hiddenLine xmlns="" xmlns:a14="http://schemas.microsoft.com/office/drawing/2010/main" w="9525">
                     <a:solidFill>
                       <a:srgbClr val="000000"/>
                     </a:solidFill>
@@ -10417,7 +10422,7 @@
               </a:ln>
               <a:extLst>
                 <a:ext uri="{91240B29-F687-4f45-9708-019B960494DF}">
-                  <a14:hiddenLine xmlns:a14="http://schemas.microsoft.com/office/drawing/2010/main" xmlns="" w="9525">
+                  <a14:hiddenLine xmlns="" xmlns:a14="http://schemas.microsoft.com/office/drawing/2010/main" w="9525">
                     <a:solidFill>
                       <a:srgbClr val="000000"/>
                     </a:solidFill>
@@ -10507,7 +10512,7 @@
               </a:ln>
               <a:extLst>
                 <a:ext uri="{91240B29-F687-4f45-9708-019B960494DF}">
-                  <a14:hiddenLine xmlns:a14="http://schemas.microsoft.com/office/drawing/2010/main" xmlns="" w="9525">
+                  <a14:hiddenLine xmlns="" xmlns:a14="http://schemas.microsoft.com/office/drawing/2010/main" w="9525">
                     <a:solidFill>
                       <a:srgbClr val="000000"/>
                     </a:solidFill>
@@ -10572,7 +10577,7 @@
               </a:ln>
               <a:extLst>
                 <a:ext uri="{91240B29-F687-4f45-9708-019B960494DF}">
-                  <a14:hiddenLine xmlns:a14="http://schemas.microsoft.com/office/drawing/2010/main" xmlns="" w="9525">
+                  <a14:hiddenLine xmlns="" xmlns:a14="http://schemas.microsoft.com/office/drawing/2010/main" w="9525">
                     <a:solidFill>
                       <a:srgbClr val="000000"/>
                     </a:solidFill>
@@ -10634,7 +10639,7 @@
               </a:ln>
               <a:extLst>
                 <a:ext uri="{91240B29-F687-4f45-9708-019B960494DF}">
-                  <a14:hiddenLine xmlns:a14="http://schemas.microsoft.com/office/drawing/2010/main" xmlns="" w="9525">
+                  <a14:hiddenLine xmlns="" xmlns:a14="http://schemas.microsoft.com/office/drawing/2010/main" w="9525">
                     <a:solidFill>
                       <a:srgbClr val="000000"/>
                     </a:solidFill>
@@ -10724,7 +10729,7 @@
               </a:ln>
               <a:extLst>
                 <a:ext uri="{91240B29-F687-4f45-9708-019B960494DF}">
-                  <a14:hiddenLine xmlns:a14="http://schemas.microsoft.com/office/drawing/2010/main" xmlns="" w="9525">
+                  <a14:hiddenLine xmlns="" xmlns:a14="http://schemas.microsoft.com/office/drawing/2010/main" w="9525">
                     <a:solidFill>
                       <a:srgbClr val="000000"/>
                     </a:solidFill>
@@ -10814,7 +10819,7 @@
               </a:ln>
               <a:extLst>
                 <a:ext uri="{91240B29-F687-4f45-9708-019B960494DF}">
-                  <a14:hiddenLine xmlns:a14="http://schemas.microsoft.com/office/drawing/2010/main" xmlns="" w="9525">
+                  <a14:hiddenLine xmlns="" xmlns:a14="http://schemas.microsoft.com/office/drawing/2010/main" w="9525">
                     <a:solidFill>
                       <a:srgbClr val="000000"/>
                     </a:solidFill>
@@ -10879,7 +10884,7 @@
               </a:ln>
               <a:extLst>
                 <a:ext uri="{91240B29-F687-4f45-9708-019B960494DF}">
-                  <a14:hiddenLine xmlns:a14="http://schemas.microsoft.com/office/drawing/2010/main" xmlns="" w="9525">
+                  <a14:hiddenLine xmlns="" xmlns:a14="http://schemas.microsoft.com/office/drawing/2010/main" w="9525">
                     <a:solidFill>
                       <a:srgbClr val="000000"/>
                     </a:solidFill>
@@ -10999,7 +11004,7 @@
               </a:ln>
               <a:extLst>
                 <a:ext uri="{91240B29-F687-4f45-9708-019B960494DF}">
-                  <a14:hiddenLine xmlns:a14="http://schemas.microsoft.com/office/drawing/2010/main" xmlns="" w="9525">
+                  <a14:hiddenLine xmlns="" xmlns:a14="http://schemas.microsoft.com/office/drawing/2010/main" w="9525">
                     <a:solidFill>
                       <a:srgbClr val="000000"/>
                     </a:solidFill>
@@ -11097,7 +11102,7 @@
               </a:ln>
               <a:extLst>
                 <a:ext uri="{91240B29-F687-4f45-9708-019B960494DF}">
-                  <a14:hiddenLine xmlns:a14="http://schemas.microsoft.com/office/drawing/2010/main" xmlns="" w="9525">
+                  <a14:hiddenLine xmlns="" xmlns:a14="http://schemas.microsoft.com/office/drawing/2010/main" w="9525">
                     <a:solidFill>
                       <a:srgbClr val="000000"/>
                     </a:solidFill>
@@ -11212,7 +11217,7 @@
               </a:ln>
               <a:extLst>
                 <a:ext uri="{91240B29-F687-4f45-9708-019B960494DF}">
-                  <a14:hiddenLine xmlns:a14="http://schemas.microsoft.com/office/drawing/2010/main" xmlns="" w="9525">
+                  <a14:hiddenLine xmlns="" xmlns:a14="http://schemas.microsoft.com/office/drawing/2010/main" w="9525">
                     <a:solidFill>
                       <a:srgbClr val="000000"/>
                     </a:solidFill>
@@ -11302,7 +11307,7 @@
               </a:ln>
               <a:extLst>
                 <a:ext uri="{91240B29-F687-4f45-9708-019B960494DF}">
-                  <a14:hiddenLine xmlns:a14="http://schemas.microsoft.com/office/drawing/2010/main" xmlns="" w="9525">
+                  <a14:hiddenLine xmlns="" xmlns:a14="http://schemas.microsoft.com/office/drawing/2010/main" w="9525">
                     <a:solidFill>
                       <a:srgbClr val="000000"/>
                     </a:solidFill>
@@ -11367,7 +11372,7 @@
               </a:ln>
               <a:extLst>
                 <a:ext uri="{91240B29-F687-4f45-9708-019B960494DF}">
-                  <a14:hiddenLine xmlns:a14="http://schemas.microsoft.com/office/drawing/2010/main" xmlns="" w="9525">
+                  <a14:hiddenLine xmlns="" xmlns:a14="http://schemas.microsoft.com/office/drawing/2010/main" w="9525">
                     <a:solidFill>
                       <a:srgbClr val="000000"/>
                     </a:solidFill>
@@ -11457,7 +11462,7 @@
               </a:ln>
               <a:extLst>
                 <a:ext uri="{91240B29-F687-4f45-9708-019B960494DF}">
-                  <a14:hiddenLine xmlns:a14="http://schemas.microsoft.com/office/drawing/2010/main" xmlns="" w="9525">
+                  <a14:hiddenLine xmlns="" xmlns:a14="http://schemas.microsoft.com/office/drawing/2010/main" w="9525">
                     <a:solidFill>
                       <a:srgbClr val="000000"/>
                     </a:solidFill>
@@ -11525,7 +11530,7 @@
               </a:ln>
               <a:extLst>
                 <a:ext uri="{91240B29-F687-4f45-9708-019B960494DF}">
-                  <a14:hiddenLine xmlns:a14="http://schemas.microsoft.com/office/drawing/2010/main" xmlns="" w="9525">
+                  <a14:hiddenLine xmlns="" xmlns:a14="http://schemas.microsoft.com/office/drawing/2010/main" w="9525">
                     <a:solidFill>
                       <a:srgbClr val="000000"/>
                     </a:solidFill>
@@ -11615,7 +11620,7 @@
               </a:ln>
               <a:extLst>
                 <a:ext uri="{91240B29-F687-4f45-9708-019B960494DF}">
-                  <a14:hiddenLine xmlns:a14="http://schemas.microsoft.com/office/drawing/2010/main" xmlns="" w="9525">
+                  <a14:hiddenLine xmlns="" xmlns:a14="http://schemas.microsoft.com/office/drawing/2010/main" w="9525">
                     <a:solidFill>
                       <a:srgbClr val="000000"/>
                     </a:solidFill>
@@ -11683,7 +11688,7 @@
               </a:ln>
               <a:extLst>
                 <a:ext uri="{91240B29-F687-4f45-9708-019B960494DF}">
-                  <a14:hiddenLine xmlns:a14="http://schemas.microsoft.com/office/drawing/2010/main" xmlns="" w="9525">
+                  <a14:hiddenLine xmlns="" xmlns:a14="http://schemas.microsoft.com/office/drawing/2010/main" w="9525">
                     <a:solidFill>
                       <a:srgbClr val="000000"/>
                     </a:solidFill>
@@ -11773,7 +11778,7 @@
               </a:ln>
               <a:extLst>
                 <a:ext uri="{91240B29-F687-4f45-9708-019B960494DF}">
-                  <a14:hiddenLine xmlns:a14="http://schemas.microsoft.com/office/drawing/2010/main" xmlns="" w="9525">
+                  <a14:hiddenLine xmlns="" xmlns:a14="http://schemas.microsoft.com/office/drawing/2010/main" w="9525">
                     <a:solidFill>
                       <a:srgbClr val="000000"/>
                     </a:solidFill>
@@ -11807,7 +11812,7 @@
               </a:ln>
               <a:extLst>
                 <a:ext uri="{91240B29-F687-4f45-9708-019B960494DF}">
-                  <a14:hiddenLine xmlns:a14="http://schemas.microsoft.com/office/drawing/2010/main" xmlns="" w="9525">
+                  <a14:hiddenLine xmlns="" xmlns:a14="http://schemas.microsoft.com/office/drawing/2010/main" w="9525">
                     <a:solidFill>
                       <a:srgbClr val="000000"/>
                     </a:solidFill>
@@ -11948,7 +11953,7 @@
             <a:fld id="{48A87A34-81AB-432B-8DAE-1953F412C126}" type="datetimeFigureOut">
               <a:rPr lang="en-US" dirty="0"/>
               <a:pPr/>
-              <a:t>4/22/2018</a:t>
+              <a:t>4/23/2018</a:t>
             </a:fld>
             <a:endParaRPr lang="en-US" dirty="0"/>
           </a:p>
@@ -12387,7 +12392,7 @@
           <a:p>
             <a:r>
               <a:rPr lang="en-US" dirty="0"/>
-              <a:t>Applications of Quantum Mechanics in Electronics	</a:t>
+              <a:t>Applications of Quantum Mechanics in Electronics under Research</a:t>
             </a:r>
           </a:p>
         </p:txBody>
@@ -12638,6 +12643,13 @@
             </a:r>
           </a:p>
           <a:p>
+            <a:pPr lvl="1"/>
+            <a:r>
+              <a:rPr lang="en-US" dirty="0"/>
+              <a:t>Small amount of drift can cause wireless devices to broadcast in different frequencies  or lose synchronization between devices</a:t>
+            </a:r>
+          </a:p>
+          <a:p>
             <a:r>
               <a:rPr lang="en-US" dirty="0"/>
               <a:t>Pendulum—moves back and forth with simple harmonic motion (ideally)</a:t>
@@ -12653,7 +12665,14 @@
           <a:p>
             <a:r>
               <a:rPr lang="en-US" dirty="0"/>
-              <a:t>Quartz crystal--</a:t>
+              <a:t>Quartz crystal—piezoelectric device, produces electro-mechanical vibrations</a:t>
+            </a:r>
+          </a:p>
+          <a:p>
+            <a:pPr lvl="1"/>
+            <a:r>
+              <a:rPr lang="en-US" dirty="0"/>
+              <a:t>Sensitive to temperature and humidity</a:t>
             </a:r>
           </a:p>
         </p:txBody>
@@ -12742,6 +12761,12 @@
                 <a:r>
                   <a:rPr lang="en-US" dirty="0"/>
                   <a:t>Monitor radiation frequency needed to make electrons jump between energy levels</a:t>
+                </a:r>
+              </a:p>
+              <a:p>
+                <a:r>
+                  <a:rPr lang="en-US" dirty="0"/>
+                  <a:t>Laser light of specific wavelength needed for electrons to switch energy levels</a:t>
                 </a:r>
               </a:p>
               <a:p>
@@ -12923,7 +12948,7 @@
           <a:noFill/>
           <a:extLst>
             <a:ext uri="{909E8E84-426E-40dd-AFC4-6F175D3DCCD1}">
-              <a14:hiddenFill xmlns="" xmlns:p14="http://schemas.microsoft.com/office/powerpoint/2010/main" xmlns:a14="http://schemas.microsoft.com/office/drawing/2010/main">
+              <a14:hiddenFill xmlns:a14="http://schemas.microsoft.com/office/drawing/2010/main" xmlns:p14="http://schemas.microsoft.com/office/powerpoint/2010/main" xmlns="">
                 <a:solidFill>
                   <a:srgbClr val="FFFFFF"/>
                 </a:solidFill>
@@ -13035,7 +13060,7 @@
               </a:ln>
               <a:extLst>
                 <a:ext uri="{91240B29-F687-4f45-9708-019B960494DF}">
-                  <a14:hiddenLine xmlns="" xmlns:p14="http://schemas.microsoft.com/office/powerpoint/2010/main" xmlns:a14="http://schemas.microsoft.com/office/drawing/2010/main" w="9525">
+                  <a14:hiddenLine xmlns:a14="http://schemas.microsoft.com/office/drawing/2010/main" xmlns:p14="http://schemas.microsoft.com/office/powerpoint/2010/main" xmlns="" w="9525">
                     <a:solidFill>
                       <a:srgbClr val="000000"/>
                     </a:solidFill>
@@ -13137,7 +13162,7 @@
               </a:ln>
               <a:extLst>
                 <a:ext uri="{91240B29-F687-4f45-9708-019B960494DF}">
-                  <a14:hiddenLine xmlns="" xmlns:p14="http://schemas.microsoft.com/office/powerpoint/2010/main" xmlns:a14="http://schemas.microsoft.com/office/drawing/2010/main" w="9525">
+                  <a14:hiddenLine xmlns:a14="http://schemas.microsoft.com/office/drawing/2010/main" xmlns:p14="http://schemas.microsoft.com/office/powerpoint/2010/main" xmlns="" w="9525">
                     <a:solidFill>
                       <a:srgbClr val="000000"/>
                     </a:solidFill>
@@ -13239,7 +13264,7 @@
               </a:ln>
               <a:extLst>
                 <a:ext uri="{91240B29-F687-4f45-9708-019B960494DF}">
-                  <a14:hiddenLine xmlns="" xmlns:p14="http://schemas.microsoft.com/office/powerpoint/2010/main" xmlns:a14="http://schemas.microsoft.com/office/drawing/2010/main" w="9525">
+                  <a14:hiddenLine xmlns:a14="http://schemas.microsoft.com/office/drawing/2010/main" xmlns:p14="http://schemas.microsoft.com/office/powerpoint/2010/main" xmlns="" w="9525">
                     <a:solidFill>
                       <a:srgbClr val="000000"/>
                     </a:solidFill>
@@ -13313,7 +13338,7 @@
               </a:ln>
               <a:extLst>
                 <a:ext uri="{91240B29-F687-4f45-9708-019B960494DF}">
-                  <a14:hiddenLine xmlns="" xmlns:p14="http://schemas.microsoft.com/office/powerpoint/2010/main" xmlns:a14="http://schemas.microsoft.com/office/drawing/2010/main" w="9525">
+                  <a14:hiddenLine xmlns:a14="http://schemas.microsoft.com/office/drawing/2010/main" xmlns:p14="http://schemas.microsoft.com/office/powerpoint/2010/main" xmlns="" w="9525">
                     <a:solidFill>
                       <a:srgbClr val="000000"/>
                     </a:solidFill>
@@ -13415,7 +13440,7 @@
               </a:ln>
               <a:extLst>
                 <a:ext uri="{91240B29-F687-4f45-9708-019B960494DF}">
-                  <a14:hiddenLine xmlns="" xmlns:p14="http://schemas.microsoft.com/office/powerpoint/2010/main" xmlns:a14="http://schemas.microsoft.com/office/drawing/2010/main" w="9525">
+                  <a14:hiddenLine xmlns:a14="http://schemas.microsoft.com/office/drawing/2010/main" xmlns:p14="http://schemas.microsoft.com/office/powerpoint/2010/main" xmlns="" w="9525">
                     <a:solidFill>
                       <a:srgbClr val="000000"/>
                     </a:solidFill>
@@ -13489,7 +13514,7 @@
               </a:ln>
               <a:extLst>
                 <a:ext uri="{91240B29-F687-4f45-9708-019B960494DF}">
-                  <a14:hiddenLine xmlns="" xmlns:p14="http://schemas.microsoft.com/office/powerpoint/2010/main" xmlns:a14="http://schemas.microsoft.com/office/drawing/2010/main" w="9525">
+                  <a14:hiddenLine xmlns:a14="http://schemas.microsoft.com/office/drawing/2010/main" xmlns:p14="http://schemas.microsoft.com/office/powerpoint/2010/main" xmlns="" w="9525">
                     <a:solidFill>
                       <a:srgbClr val="000000"/>
                     </a:solidFill>
@@ -13563,7 +13588,7 @@
               </a:ln>
               <a:extLst>
                 <a:ext uri="{91240B29-F687-4f45-9708-019B960494DF}">
-                  <a14:hiddenLine xmlns="" xmlns:p14="http://schemas.microsoft.com/office/powerpoint/2010/main" xmlns:a14="http://schemas.microsoft.com/office/drawing/2010/main" w="9525">
+                  <a14:hiddenLine xmlns:a14="http://schemas.microsoft.com/office/drawing/2010/main" xmlns:p14="http://schemas.microsoft.com/office/powerpoint/2010/main" xmlns="" w="9525">
                     <a:solidFill>
                       <a:srgbClr val="000000"/>
                     </a:solidFill>
@@ -13665,7 +13690,7 @@
               </a:ln>
               <a:extLst>
                 <a:ext uri="{91240B29-F687-4f45-9708-019B960494DF}">
-                  <a14:hiddenLine xmlns="" xmlns:p14="http://schemas.microsoft.com/office/powerpoint/2010/main" xmlns:a14="http://schemas.microsoft.com/office/drawing/2010/main" w="9525">
+                  <a14:hiddenLine xmlns:a14="http://schemas.microsoft.com/office/drawing/2010/main" xmlns:p14="http://schemas.microsoft.com/office/powerpoint/2010/main" xmlns="" w="9525">
                     <a:solidFill>
                       <a:srgbClr val="000000"/>
                     </a:solidFill>
@@ -13767,7 +13792,7 @@
               </a:ln>
               <a:extLst>
                 <a:ext uri="{91240B29-F687-4f45-9708-019B960494DF}">
-                  <a14:hiddenLine xmlns="" xmlns:p14="http://schemas.microsoft.com/office/powerpoint/2010/main" xmlns:a14="http://schemas.microsoft.com/office/drawing/2010/main" w="9525">
+                  <a14:hiddenLine xmlns:a14="http://schemas.microsoft.com/office/drawing/2010/main" xmlns:p14="http://schemas.microsoft.com/office/powerpoint/2010/main" xmlns="" w="9525">
                     <a:solidFill>
                       <a:srgbClr val="000000"/>
                     </a:solidFill>
@@ -13841,7 +13866,7 @@
               </a:ln>
               <a:extLst>
                 <a:ext uri="{91240B29-F687-4f45-9708-019B960494DF}">
-                  <a14:hiddenLine xmlns="" xmlns:p14="http://schemas.microsoft.com/office/powerpoint/2010/main" xmlns:a14="http://schemas.microsoft.com/office/drawing/2010/main" w="9525">
+                  <a14:hiddenLine xmlns:a14="http://schemas.microsoft.com/office/drawing/2010/main" xmlns:p14="http://schemas.microsoft.com/office/powerpoint/2010/main" xmlns="" w="9525">
                     <a:solidFill>
                       <a:srgbClr val="000000"/>
                     </a:solidFill>
@@ -13963,7 +13988,7 @@
               </a:ln>
               <a:extLst>
                 <a:ext uri="{91240B29-F687-4f45-9708-019B960494DF}">
-                  <a14:hiddenLine xmlns="" xmlns:p14="http://schemas.microsoft.com/office/powerpoint/2010/main" xmlns:a14="http://schemas.microsoft.com/office/drawing/2010/main" w="9525">
+                  <a14:hiddenLine xmlns:a14="http://schemas.microsoft.com/office/drawing/2010/main" xmlns:p14="http://schemas.microsoft.com/office/powerpoint/2010/main" xmlns="" w="9525">
                     <a:solidFill>
                       <a:srgbClr val="000000"/>
                     </a:solidFill>
@@ -14071,7 +14096,7 @@
               </a:ln>
               <a:extLst>
                 <a:ext uri="{91240B29-F687-4f45-9708-019B960494DF}">
-                  <a14:hiddenLine xmlns="" xmlns:p14="http://schemas.microsoft.com/office/powerpoint/2010/main" xmlns:a14="http://schemas.microsoft.com/office/drawing/2010/main" w="9525">
+                  <a14:hiddenLine xmlns:a14="http://schemas.microsoft.com/office/drawing/2010/main" xmlns:p14="http://schemas.microsoft.com/office/powerpoint/2010/main" xmlns="" w="9525">
                     <a:solidFill>
                       <a:srgbClr val="000000"/>
                     </a:solidFill>
@@ -14145,7 +14170,7 @@
               </a:ln>
               <a:extLst>
                 <a:ext uri="{91240B29-F687-4f45-9708-019B960494DF}">
-                  <a14:hiddenLine xmlns="" xmlns:p14="http://schemas.microsoft.com/office/powerpoint/2010/main" xmlns:a14="http://schemas.microsoft.com/office/drawing/2010/main" w="9525">
+                  <a14:hiddenLine xmlns:a14="http://schemas.microsoft.com/office/drawing/2010/main" xmlns:p14="http://schemas.microsoft.com/office/powerpoint/2010/main" xmlns="" w="9525">
                     <a:solidFill>
                       <a:srgbClr val="000000"/>
                     </a:solidFill>
@@ -14219,7 +14244,7 @@
               </a:ln>
               <a:extLst>
                 <a:ext uri="{91240B29-F687-4f45-9708-019B960494DF}">
-                  <a14:hiddenLine xmlns="" xmlns:p14="http://schemas.microsoft.com/office/powerpoint/2010/main" xmlns:a14="http://schemas.microsoft.com/office/drawing/2010/main" w="9525">
+                  <a14:hiddenLine xmlns:a14="http://schemas.microsoft.com/office/drawing/2010/main" xmlns:p14="http://schemas.microsoft.com/office/powerpoint/2010/main" xmlns="" w="9525">
                     <a:solidFill>
                       <a:srgbClr val="000000"/>
                     </a:solidFill>
@@ -14321,7 +14346,7 @@
               </a:ln>
               <a:extLst>
                 <a:ext uri="{91240B29-F687-4f45-9708-019B960494DF}">
-                  <a14:hiddenLine xmlns="" xmlns:p14="http://schemas.microsoft.com/office/powerpoint/2010/main" xmlns:a14="http://schemas.microsoft.com/office/drawing/2010/main" w="9525">
+                  <a14:hiddenLine xmlns:a14="http://schemas.microsoft.com/office/drawing/2010/main" xmlns:p14="http://schemas.microsoft.com/office/powerpoint/2010/main" xmlns="" w="9525">
                     <a:solidFill>
                       <a:srgbClr val="000000"/>
                     </a:solidFill>
@@ -14367,7 +14392,7 @@
               </a:ln>
               <a:extLst>
                 <a:ext uri="{91240B29-F687-4f45-9708-019B960494DF}">
-                  <a14:hiddenLine xmlns="" xmlns:p14="http://schemas.microsoft.com/office/powerpoint/2010/main" xmlns:a14="http://schemas.microsoft.com/office/drawing/2010/main" w="9525">
+                  <a14:hiddenLine xmlns:a14="http://schemas.microsoft.com/office/drawing/2010/main" xmlns:p14="http://schemas.microsoft.com/office/powerpoint/2010/main" xmlns="" w="9525">
                     <a:solidFill>
                       <a:srgbClr val="000000"/>
                     </a:solidFill>
@@ -14444,7 +14469,7 @@
               </a:ln>
               <a:extLst>
                 <a:ext uri="{91240B29-F687-4f45-9708-019B960494DF}">
-                  <a14:hiddenLine xmlns="" xmlns:p14="http://schemas.microsoft.com/office/powerpoint/2010/main" xmlns:a14="http://schemas.microsoft.com/office/drawing/2010/main" w="9525">
+                  <a14:hiddenLine xmlns:a14="http://schemas.microsoft.com/office/drawing/2010/main" xmlns:p14="http://schemas.microsoft.com/office/powerpoint/2010/main" xmlns="" w="9525">
                     <a:solidFill>
                       <a:srgbClr val="000000"/>
                     </a:solidFill>
@@ -14546,7 +14571,7 @@
               </a:ln>
               <a:extLst>
                 <a:ext uri="{91240B29-F687-4f45-9708-019B960494DF}">
-                  <a14:hiddenLine xmlns="" xmlns:p14="http://schemas.microsoft.com/office/powerpoint/2010/main" xmlns:a14="http://schemas.microsoft.com/office/drawing/2010/main" w="9525">
+                  <a14:hiddenLine xmlns:a14="http://schemas.microsoft.com/office/drawing/2010/main" xmlns:p14="http://schemas.microsoft.com/office/powerpoint/2010/main" xmlns="" w="9525">
                     <a:solidFill>
                       <a:srgbClr val="000000"/>
                     </a:solidFill>
@@ -14620,7 +14645,7 @@
               </a:ln>
               <a:extLst>
                 <a:ext uri="{91240B29-F687-4f45-9708-019B960494DF}">
-                  <a14:hiddenLine xmlns="" xmlns:p14="http://schemas.microsoft.com/office/powerpoint/2010/main" xmlns:a14="http://schemas.microsoft.com/office/drawing/2010/main" w="9525">
+                  <a14:hiddenLine xmlns:a14="http://schemas.microsoft.com/office/drawing/2010/main" xmlns:p14="http://schemas.microsoft.com/office/powerpoint/2010/main" xmlns="" w="9525">
                     <a:solidFill>
                       <a:srgbClr val="000000"/>
                     </a:solidFill>
@@ -14722,7 +14747,7 @@
               </a:ln>
               <a:extLst>
                 <a:ext uri="{91240B29-F687-4f45-9708-019B960494DF}">
-                  <a14:hiddenLine xmlns="" xmlns:p14="http://schemas.microsoft.com/office/powerpoint/2010/main" xmlns:a14="http://schemas.microsoft.com/office/drawing/2010/main" w="9525">
+                  <a14:hiddenLine xmlns:a14="http://schemas.microsoft.com/office/drawing/2010/main" xmlns:p14="http://schemas.microsoft.com/office/powerpoint/2010/main" xmlns="" w="9525">
                     <a:solidFill>
                       <a:srgbClr val="000000"/>
                     </a:solidFill>
@@ -14799,7 +14824,7 @@
               </a:ln>
               <a:extLst>
                 <a:ext uri="{91240B29-F687-4f45-9708-019B960494DF}">
-                  <a14:hiddenLine xmlns="" xmlns:p14="http://schemas.microsoft.com/office/powerpoint/2010/main" xmlns:a14="http://schemas.microsoft.com/office/drawing/2010/main" w="9525">
+                  <a14:hiddenLine xmlns:a14="http://schemas.microsoft.com/office/drawing/2010/main" xmlns:p14="http://schemas.microsoft.com/office/powerpoint/2010/main" xmlns="" w="9525">
                     <a:solidFill>
                       <a:srgbClr val="000000"/>
                     </a:solidFill>
@@ -14873,7 +14898,7 @@
               </a:ln>
               <a:extLst>
                 <a:ext uri="{91240B29-F687-4f45-9708-019B960494DF}">
-                  <a14:hiddenLine xmlns="" xmlns:p14="http://schemas.microsoft.com/office/powerpoint/2010/main" xmlns:a14="http://schemas.microsoft.com/office/drawing/2010/main" w="9525">
+                  <a14:hiddenLine xmlns:a14="http://schemas.microsoft.com/office/drawing/2010/main" xmlns:p14="http://schemas.microsoft.com/office/powerpoint/2010/main" xmlns="" w="9525">
                     <a:solidFill>
                       <a:srgbClr val="000000"/>
                     </a:solidFill>
@@ -14975,7 +15000,7 @@
               </a:ln>
               <a:extLst>
                 <a:ext uri="{91240B29-F687-4f45-9708-019B960494DF}">
-                  <a14:hiddenLine xmlns="" xmlns:p14="http://schemas.microsoft.com/office/powerpoint/2010/main" xmlns:a14="http://schemas.microsoft.com/office/drawing/2010/main" w="9525">
+                  <a14:hiddenLine xmlns:a14="http://schemas.microsoft.com/office/drawing/2010/main" xmlns:p14="http://schemas.microsoft.com/office/powerpoint/2010/main" xmlns="" w="9525">
                     <a:solidFill>
                       <a:srgbClr val="000000"/>
                     </a:solidFill>
@@ -15077,7 +15102,7 @@
               </a:ln>
               <a:extLst>
                 <a:ext uri="{91240B29-F687-4f45-9708-019B960494DF}">
-                  <a14:hiddenLine xmlns="" xmlns:p14="http://schemas.microsoft.com/office/powerpoint/2010/main" xmlns:a14="http://schemas.microsoft.com/office/drawing/2010/main" w="9525">
+                  <a14:hiddenLine xmlns:a14="http://schemas.microsoft.com/office/drawing/2010/main" xmlns:p14="http://schemas.microsoft.com/office/powerpoint/2010/main" xmlns="" w="9525">
                     <a:solidFill>
                       <a:srgbClr val="000000"/>
                     </a:solidFill>
@@ -15154,7 +15179,7 @@
               </a:ln>
               <a:extLst>
                 <a:ext uri="{91240B29-F687-4f45-9708-019B960494DF}">
-                  <a14:hiddenLine xmlns="" xmlns:p14="http://schemas.microsoft.com/office/powerpoint/2010/main" xmlns:a14="http://schemas.microsoft.com/office/drawing/2010/main" w="9525">
+                  <a14:hiddenLine xmlns:a14="http://schemas.microsoft.com/office/drawing/2010/main" xmlns:p14="http://schemas.microsoft.com/office/powerpoint/2010/main" xmlns="" w="9525">
                     <a:solidFill>
                       <a:srgbClr val="000000"/>
                     </a:solidFill>
@@ -15286,7 +15311,7 @@
               </a:ln>
               <a:extLst>
                 <a:ext uri="{91240B29-F687-4f45-9708-019B960494DF}">
-                  <a14:hiddenLine xmlns="" xmlns:p14="http://schemas.microsoft.com/office/powerpoint/2010/main" xmlns:a14="http://schemas.microsoft.com/office/drawing/2010/main" w="9525">
+                  <a14:hiddenLine xmlns:a14="http://schemas.microsoft.com/office/drawing/2010/main" xmlns:p14="http://schemas.microsoft.com/office/powerpoint/2010/main" xmlns="" w="9525">
                     <a:solidFill>
                       <a:srgbClr val="000000"/>
                     </a:solidFill>
@@ -15408,7 +15433,7 @@
               </a:ln>
               <a:extLst>
                 <a:ext uri="{91240B29-F687-4f45-9708-019B960494DF}">
-                  <a14:hiddenLine xmlns="" xmlns:p14="http://schemas.microsoft.com/office/powerpoint/2010/main" xmlns:a14="http://schemas.microsoft.com/office/drawing/2010/main" w="9525">
+                  <a14:hiddenLine xmlns:a14="http://schemas.microsoft.com/office/drawing/2010/main" xmlns:p14="http://schemas.microsoft.com/office/powerpoint/2010/main" xmlns="" w="9525">
                     <a:solidFill>
                       <a:srgbClr val="000000"/>
                     </a:solidFill>
@@ -15535,7 +15560,7 @@
               </a:ln>
               <a:extLst>
                 <a:ext uri="{91240B29-F687-4f45-9708-019B960494DF}">
-                  <a14:hiddenLine xmlns="" xmlns:p14="http://schemas.microsoft.com/office/powerpoint/2010/main" xmlns:a14="http://schemas.microsoft.com/office/drawing/2010/main" w="9525">
+                  <a14:hiddenLine xmlns:a14="http://schemas.microsoft.com/office/drawing/2010/main" xmlns:p14="http://schemas.microsoft.com/office/powerpoint/2010/main" xmlns="" w="9525">
                     <a:solidFill>
                       <a:srgbClr val="000000"/>
                     </a:solidFill>
@@ -15637,7 +15662,7 @@
               </a:ln>
               <a:extLst>
                 <a:ext uri="{91240B29-F687-4f45-9708-019B960494DF}">
-                  <a14:hiddenLine xmlns="" xmlns:p14="http://schemas.microsoft.com/office/powerpoint/2010/main" xmlns:a14="http://schemas.microsoft.com/office/drawing/2010/main" w="9525">
+                  <a14:hiddenLine xmlns:a14="http://schemas.microsoft.com/office/drawing/2010/main" xmlns:p14="http://schemas.microsoft.com/office/powerpoint/2010/main" xmlns="" w="9525">
                     <a:solidFill>
                       <a:srgbClr val="000000"/>
                     </a:solidFill>
@@ -15714,7 +15739,7 @@
               </a:ln>
               <a:extLst>
                 <a:ext uri="{91240B29-F687-4f45-9708-019B960494DF}">
-                  <a14:hiddenLine xmlns="" xmlns:p14="http://schemas.microsoft.com/office/powerpoint/2010/main" xmlns:a14="http://schemas.microsoft.com/office/drawing/2010/main" w="9525">
+                  <a14:hiddenLine xmlns:a14="http://schemas.microsoft.com/office/drawing/2010/main" xmlns:p14="http://schemas.microsoft.com/office/powerpoint/2010/main" xmlns="" w="9525">
                     <a:solidFill>
                       <a:srgbClr val="000000"/>
                     </a:solidFill>
@@ -15816,7 +15841,7 @@
               </a:ln>
               <a:extLst>
                 <a:ext uri="{91240B29-F687-4f45-9708-019B960494DF}">
-                  <a14:hiddenLine xmlns="" xmlns:p14="http://schemas.microsoft.com/office/powerpoint/2010/main" xmlns:a14="http://schemas.microsoft.com/office/drawing/2010/main" w="9525">
+                  <a14:hiddenLine xmlns:a14="http://schemas.microsoft.com/office/drawing/2010/main" xmlns:p14="http://schemas.microsoft.com/office/powerpoint/2010/main" xmlns="" w="9525">
                     <a:solidFill>
                       <a:srgbClr val="000000"/>
                     </a:solidFill>
@@ -15896,7 +15921,7 @@
               </a:ln>
               <a:extLst>
                 <a:ext uri="{91240B29-F687-4f45-9708-019B960494DF}">
-                  <a14:hiddenLine xmlns="" xmlns:p14="http://schemas.microsoft.com/office/powerpoint/2010/main" xmlns:a14="http://schemas.microsoft.com/office/drawing/2010/main" w="9525">
+                  <a14:hiddenLine xmlns:a14="http://schemas.microsoft.com/office/drawing/2010/main" xmlns:p14="http://schemas.microsoft.com/office/powerpoint/2010/main" xmlns="" w="9525">
                     <a:solidFill>
                       <a:srgbClr val="000000"/>
                     </a:solidFill>
@@ -15998,7 +16023,7 @@
               </a:ln>
               <a:extLst>
                 <a:ext uri="{91240B29-F687-4f45-9708-019B960494DF}">
-                  <a14:hiddenLine xmlns="" xmlns:p14="http://schemas.microsoft.com/office/powerpoint/2010/main" xmlns:a14="http://schemas.microsoft.com/office/drawing/2010/main" w="9525">
+                  <a14:hiddenLine xmlns:a14="http://schemas.microsoft.com/office/drawing/2010/main" xmlns:p14="http://schemas.microsoft.com/office/powerpoint/2010/main" xmlns="" w="9525">
                     <a:solidFill>
                       <a:srgbClr val="000000"/>
                     </a:solidFill>
@@ -16078,7 +16103,7 @@
               </a:ln>
               <a:extLst>
                 <a:ext uri="{91240B29-F687-4f45-9708-019B960494DF}">
-                  <a14:hiddenLine xmlns="" xmlns:p14="http://schemas.microsoft.com/office/powerpoint/2010/main" xmlns:a14="http://schemas.microsoft.com/office/drawing/2010/main" w="9525">
+                  <a14:hiddenLine xmlns:a14="http://schemas.microsoft.com/office/drawing/2010/main" xmlns:p14="http://schemas.microsoft.com/office/powerpoint/2010/main" xmlns="" w="9525">
                     <a:solidFill>
                       <a:srgbClr val="000000"/>
                     </a:solidFill>
@@ -16180,7 +16205,7 @@
               </a:ln>
               <a:extLst>
                 <a:ext uri="{91240B29-F687-4f45-9708-019B960494DF}">
-                  <a14:hiddenLine xmlns="" xmlns:p14="http://schemas.microsoft.com/office/powerpoint/2010/main" xmlns:a14="http://schemas.microsoft.com/office/drawing/2010/main" w="9525">
+                  <a14:hiddenLine xmlns:a14="http://schemas.microsoft.com/office/drawing/2010/main" xmlns:p14="http://schemas.microsoft.com/office/powerpoint/2010/main" xmlns="" w="9525">
                     <a:solidFill>
                       <a:srgbClr val="000000"/>
                     </a:solidFill>
@@ -16226,7 +16251,7 @@
               </a:ln>
               <a:extLst>
                 <a:ext uri="{91240B29-F687-4f45-9708-019B960494DF}">
-                  <a14:hiddenLine xmlns="" xmlns:p14="http://schemas.microsoft.com/office/powerpoint/2010/main" xmlns:a14="http://schemas.microsoft.com/office/drawing/2010/main" w="9525">
+                  <a14:hiddenLine xmlns:a14="http://schemas.microsoft.com/office/drawing/2010/main" xmlns:p14="http://schemas.microsoft.com/office/powerpoint/2010/main" xmlns="" w="9525">
                     <a:solidFill>
                       <a:srgbClr val="000000"/>
                     </a:solidFill>
@@ -16375,7 +16400,7 @@
             <a:noFill/>
             <a:extLst>
               <a:ext uri="{909E8E84-426E-40dd-AFC4-6F175D3DCCD1}">
-                <a14:hiddenFill xmlns="" xmlns:p14="http://schemas.microsoft.com/office/powerpoint/2010/main" xmlns:a14="http://schemas.microsoft.com/office/drawing/2010/main">
+                <a14:hiddenFill xmlns:a14="http://schemas.microsoft.com/office/drawing/2010/main" xmlns:p14="http://schemas.microsoft.com/office/powerpoint/2010/main" xmlns="">
                   <a:solidFill>
                     <a:srgbClr val="FFFFFF"/>
                   </a:solidFill>
@@ -16484,7 +16509,7 @@
             </a:ln>
             <a:extLst>
               <a:ext uri="{91240B29-F687-4f45-9708-019B960494DF}">
-                <a14:hiddenLine xmlns="" xmlns:p14="http://schemas.microsoft.com/office/powerpoint/2010/main" xmlns:a14="http://schemas.microsoft.com/office/drawing/2010/main" w="9525">
+                <a14:hiddenLine xmlns:a14="http://schemas.microsoft.com/office/drawing/2010/main" xmlns:p14="http://schemas.microsoft.com/office/powerpoint/2010/main" xmlns="" w="9525">
                   <a:solidFill>
                     <a:srgbClr val="000000"/>
                   </a:solidFill>
@@ -16586,7 +16611,7 @@
             </a:ln>
             <a:extLst>
               <a:ext uri="{91240B29-F687-4f45-9708-019B960494DF}">
-                <a14:hiddenLine xmlns="" xmlns:p14="http://schemas.microsoft.com/office/powerpoint/2010/main" xmlns:a14="http://schemas.microsoft.com/office/drawing/2010/main" w="9525">
+                <a14:hiddenLine xmlns:a14="http://schemas.microsoft.com/office/drawing/2010/main" xmlns:p14="http://schemas.microsoft.com/office/powerpoint/2010/main" xmlns="" w="9525">
                   <a:solidFill>
                     <a:srgbClr val="000000"/>
                   </a:solidFill>
@@ -16688,7 +16713,7 @@
             </a:ln>
             <a:extLst>
               <a:ext uri="{91240B29-F687-4f45-9708-019B960494DF}">
-                <a14:hiddenLine xmlns="" xmlns:p14="http://schemas.microsoft.com/office/powerpoint/2010/main" xmlns:a14="http://schemas.microsoft.com/office/drawing/2010/main" w="9525">
+                <a14:hiddenLine xmlns:a14="http://schemas.microsoft.com/office/drawing/2010/main" xmlns:p14="http://schemas.microsoft.com/office/powerpoint/2010/main" xmlns="" w="9525">
                   <a:solidFill>
                     <a:srgbClr val="000000"/>
                   </a:solidFill>
@@ -16734,7 +16759,7 @@
             </a:ln>
             <a:extLst>
               <a:ext uri="{91240B29-F687-4f45-9708-019B960494DF}">
-                <a14:hiddenLine xmlns="" xmlns:p14="http://schemas.microsoft.com/office/powerpoint/2010/main" xmlns:a14="http://schemas.microsoft.com/office/drawing/2010/main" w="9525">
+                <a14:hiddenLine xmlns:a14="http://schemas.microsoft.com/office/drawing/2010/main" xmlns:p14="http://schemas.microsoft.com/office/powerpoint/2010/main" xmlns="" w="9525">
                   <a:solidFill>
                     <a:srgbClr val="000000"/>
                   </a:solidFill>
@@ -16836,7 +16861,7 @@
             </a:ln>
             <a:extLst>
               <a:ext uri="{91240B29-F687-4f45-9708-019B960494DF}">
-                <a14:hiddenLine xmlns="" xmlns:p14="http://schemas.microsoft.com/office/powerpoint/2010/main" xmlns:a14="http://schemas.microsoft.com/office/drawing/2010/main" w="9525">
+                <a14:hiddenLine xmlns:a14="http://schemas.microsoft.com/office/drawing/2010/main" xmlns:p14="http://schemas.microsoft.com/office/powerpoint/2010/main" xmlns="" w="9525">
                   <a:solidFill>
                     <a:srgbClr val="000000"/>
                   </a:solidFill>
@@ -16910,7 +16935,7 @@
             </a:ln>
             <a:extLst>
               <a:ext uri="{91240B29-F687-4f45-9708-019B960494DF}">
-                <a14:hiddenLine xmlns="" xmlns:p14="http://schemas.microsoft.com/office/powerpoint/2010/main" xmlns:a14="http://schemas.microsoft.com/office/drawing/2010/main" w="9525">
+                <a14:hiddenLine xmlns:a14="http://schemas.microsoft.com/office/drawing/2010/main" xmlns:p14="http://schemas.microsoft.com/office/powerpoint/2010/main" xmlns="" w="9525">
                   <a:solidFill>
                     <a:srgbClr val="000000"/>
                   </a:solidFill>
@@ -16984,7 +17009,7 @@
             </a:ln>
             <a:extLst>
               <a:ext uri="{91240B29-F687-4f45-9708-019B960494DF}">
-                <a14:hiddenLine xmlns="" xmlns:p14="http://schemas.microsoft.com/office/powerpoint/2010/main" xmlns:a14="http://schemas.microsoft.com/office/drawing/2010/main" w="9525">
+                <a14:hiddenLine xmlns:a14="http://schemas.microsoft.com/office/drawing/2010/main" xmlns:p14="http://schemas.microsoft.com/office/powerpoint/2010/main" xmlns="" w="9525">
                   <a:solidFill>
                     <a:srgbClr val="000000"/>
                   </a:solidFill>
@@ -17086,7 +17111,7 @@
             </a:ln>
             <a:extLst>
               <a:ext uri="{91240B29-F687-4f45-9708-019B960494DF}">
-                <a14:hiddenLine xmlns="" xmlns:p14="http://schemas.microsoft.com/office/powerpoint/2010/main" xmlns:a14="http://schemas.microsoft.com/office/drawing/2010/main" w="9525">
+                <a14:hiddenLine xmlns:a14="http://schemas.microsoft.com/office/drawing/2010/main" xmlns:p14="http://schemas.microsoft.com/office/powerpoint/2010/main" xmlns="" w="9525">
                   <a:solidFill>
                     <a:srgbClr val="000000"/>
                   </a:solidFill>
@@ -17160,7 +17185,7 @@
             </a:ln>
             <a:extLst>
               <a:ext uri="{91240B29-F687-4f45-9708-019B960494DF}">
-                <a14:hiddenLine xmlns="" xmlns:p14="http://schemas.microsoft.com/office/powerpoint/2010/main" xmlns:a14="http://schemas.microsoft.com/office/drawing/2010/main" w="9525">
+                <a14:hiddenLine xmlns:a14="http://schemas.microsoft.com/office/drawing/2010/main" xmlns:p14="http://schemas.microsoft.com/office/powerpoint/2010/main" xmlns="" w="9525">
                   <a:solidFill>
                     <a:srgbClr val="000000"/>
                   </a:solidFill>
@@ -17234,7 +17259,7 @@
             </a:ln>
             <a:extLst>
               <a:ext uri="{91240B29-F687-4f45-9708-019B960494DF}">
-                <a14:hiddenLine xmlns="" xmlns:p14="http://schemas.microsoft.com/office/powerpoint/2010/main" xmlns:a14="http://schemas.microsoft.com/office/drawing/2010/main" w="9525">
+                <a14:hiddenLine xmlns:a14="http://schemas.microsoft.com/office/drawing/2010/main" xmlns:p14="http://schemas.microsoft.com/office/powerpoint/2010/main" xmlns="" w="9525">
                   <a:solidFill>
                     <a:srgbClr val="000000"/>
                   </a:solidFill>
@@ -17336,7 +17361,7 @@
             </a:ln>
             <a:extLst>
               <a:ext uri="{91240B29-F687-4f45-9708-019B960494DF}">
-                <a14:hiddenLine xmlns="" xmlns:p14="http://schemas.microsoft.com/office/powerpoint/2010/main" xmlns:a14="http://schemas.microsoft.com/office/drawing/2010/main" w="9525">
+                <a14:hiddenLine xmlns:a14="http://schemas.microsoft.com/office/drawing/2010/main" xmlns:p14="http://schemas.microsoft.com/office/powerpoint/2010/main" xmlns="" w="9525">
                   <a:solidFill>
                     <a:srgbClr val="000000"/>
                   </a:solidFill>
@@ -17438,7 +17463,7 @@
             </a:ln>
             <a:extLst>
               <a:ext uri="{91240B29-F687-4f45-9708-019B960494DF}">
-                <a14:hiddenLine xmlns="" xmlns:p14="http://schemas.microsoft.com/office/powerpoint/2010/main" xmlns:a14="http://schemas.microsoft.com/office/drawing/2010/main" w="9525">
+                <a14:hiddenLine xmlns:a14="http://schemas.microsoft.com/office/drawing/2010/main" xmlns:p14="http://schemas.microsoft.com/office/powerpoint/2010/main" xmlns="" w="9525">
                   <a:solidFill>
                     <a:srgbClr val="000000"/>
                   </a:solidFill>
@@ -17512,7 +17537,7 @@
             </a:ln>
             <a:extLst>
               <a:ext uri="{91240B29-F687-4f45-9708-019B960494DF}">
-                <a14:hiddenLine xmlns="" xmlns:p14="http://schemas.microsoft.com/office/powerpoint/2010/main" xmlns:a14="http://schemas.microsoft.com/office/drawing/2010/main" w="9525">
+                <a14:hiddenLine xmlns:a14="http://schemas.microsoft.com/office/drawing/2010/main" xmlns:p14="http://schemas.microsoft.com/office/powerpoint/2010/main" xmlns="" w="9525">
                   <a:solidFill>
                     <a:srgbClr val="000000"/>
                   </a:solidFill>
@@ -17634,7 +17659,7 @@
             </a:ln>
             <a:extLst>
               <a:ext uri="{91240B29-F687-4f45-9708-019B960494DF}">
-                <a14:hiddenLine xmlns="" xmlns:p14="http://schemas.microsoft.com/office/powerpoint/2010/main" xmlns:a14="http://schemas.microsoft.com/office/drawing/2010/main" w="9525">
+                <a14:hiddenLine xmlns:a14="http://schemas.microsoft.com/office/drawing/2010/main" xmlns:p14="http://schemas.microsoft.com/office/powerpoint/2010/main" xmlns="" w="9525">
                   <a:solidFill>
                     <a:srgbClr val="000000"/>
                   </a:solidFill>
@@ -17708,7 +17733,7 @@
             </a:ln>
             <a:extLst>
               <a:ext uri="{91240B29-F687-4f45-9708-019B960494DF}">
-                <a14:hiddenLine xmlns="" xmlns:p14="http://schemas.microsoft.com/office/powerpoint/2010/main" xmlns:a14="http://schemas.microsoft.com/office/drawing/2010/main" w="9525">
+                <a14:hiddenLine xmlns:a14="http://schemas.microsoft.com/office/drawing/2010/main" xmlns:p14="http://schemas.microsoft.com/office/powerpoint/2010/main" xmlns="" w="9525">
                   <a:solidFill>
                     <a:srgbClr val="000000"/>
                   </a:solidFill>
@@ -17810,7 +17835,7 @@
             </a:ln>
             <a:extLst>
               <a:ext uri="{91240B29-F687-4f45-9708-019B960494DF}">
-                <a14:hiddenLine xmlns="" xmlns:p14="http://schemas.microsoft.com/office/powerpoint/2010/main" xmlns:a14="http://schemas.microsoft.com/office/drawing/2010/main" w="9525">
+                <a14:hiddenLine xmlns:a14="http://schemas.microsoft.com/office/drawing/2010/main" xmlns:p14="http://schemas.microsoft.com/office/powerpoint/2010/main" xmlns="" w="9525">
                   <a:solidFill>
                     <a:srgbClr val="000000"/>
                   </a:solidFill>
@@ -17912,7 +17937,7 @@
             </a:ln>
             <a:extLst>
               <a:ext uri="{91240B29-F687-4f45-9708-019B960494DF}">
-                <a14:hiddenLine xmlns="" xmlns:p14="http://schemas.microsoft.com/office/powerpoint/2010/main" xmlns:a14="http://schemas.microsoft.com/office/drawing/2010/main" w="9525">
+                <a14:hiddenLine xmlns:a14="http://schemas.microsoft.com/office/drawing/2010/main" xmlns:p14="http://schemas.microsoft.com/office/powerpoint/2010/main" xmlns="" w="9525">
                   <a:solidFill>
                     <a:srgbClr val="000000"/>
                   </a:solidFill>
@@ -17986,7 +18011,7 @@
             </a:ln>
             <a:extLst>
               <a:ext uri="{91240B29-F687-4f45-9708-019B960494DF}">
-                <a14:hiddenLine xmlns="" xmlns:p14="http://schemas.microsoft.com/office/powerpoint/2010/main" xmlns:a14="http://schemas.microsoft.com/office/drawing/2010/main" w="9525">
+                <a14:hiddenLine xmlns:a14="http://schemas.microsoft.com/office/drawing/2010/main" xmlns:p14="http://schemas.microsoft.com/office/powerpoint/2010/main" xmlns="" w="9525">
                   <a:solidFill>
                     <a:srgbClr val="000000"/>
                   </a:solidFill>
@@ -18088,7 +18113,7 @@
             </a:ln>
             <a:extLst>
               <a:ext uri="{91240B29-F687-4f45-9708-019B960494DF}">
-                <a14:hiddenLine xmlns="" xmlns:p14="http://schemas.microsoft.com/office/powerpoint/2010/main" xmlns:a14="http://schemas.microsoft.com/office/drawing/2010/main" w="9525">
+                <a14:hiddenLine xmlns:a14="http://schemas.microsoft.com/office/drawing/2010/main" xmlns:p14="http://schemas.microsoft.com/office/powerpoint/2010/main" xmlns="" w="9525">
                   <a:solidFill>
                     <a:srgbClr val="000000"/>
                   </a:solidFill>
@@ -18190,7 +18215,7 @@
             </a:ln>
             <a:extLst>
               <a:ext uri="{91240B29-F687-4f45-9708-019B960494DF}">
-                <a14:hiddenLine xmlns="" xmlns:p14="http://schemas.microsoft.com/office/powerpoint/2010/main" xmlns:a14="http://schemas.microsoft.com/office/drawing/2010/main" w="9525">
+                <a14:hiddenLine xmlns:a14="http://schemas.microsoft.com/office/drawing/2010/main" xmlns:p14="http://schemas.microsoft.com/office/powerpoint/2010/main" xmlns="" w="9525">
                   <a:solidFill>
                     <a:srgbClr val="000000"/>
                   </a:solidFill>
@@ -18258,7 +18283,7 @@
             </a:ln>
             <a:extLst>
               <a:ext uri="{91240B29-F687-4f45-9708-019B960494DF}">
-                <a14:hiddenLine xmlns="" xmlns:p14="http://schemas.microsoft.com/office/powerpoint/2010/main" xmlns:a14="http://schemas.microsoft.com/office/drawing/2010/main" w="9525">
+                <a14:hiddenLine xmlns:a14="http://schemas.microsoft.com/office/drawing/2010/main" xmlns:p14="http://schemas.microsoft.com/office/powerpoint/2010/main" xmlns="" w="9525">
                   <a:solidFill>
                     <a:srgbClr val="000000"/>
                   </a:solidFill>
@@ -18360,7 +18385,7 @@
             </a:ln>
             <a:extLst>
               <a:ext uri="{91240B29-F687-4f45-9708-019B960494DF}">
-                <a14:hiddenLine xmlns="" xmlns:p14="http://schemas.microsoft.com/office/powerpoint/2010/main" xmlns:a14="http://schemas.microsoft.com/office/drawing/2010/main" w="9525">
+                <a14:hiddenLine xmlns:a14="http://schemas.microsoft.com/office/drawing/2010/main" xmlns:p14="http://schemas.microsoft.com/office/powerpoint/2010/main" xmlns="" w="9525">
                   <a:solidFill>
                     <a:srgbClr val="000000"/>
                   </a:solidFill>
@@ -18428,7 +18453,7 @@
             </a:ln>
             <a:extLst>
               <a:ext uri="{91240B29-F687-4f45-9708-019B960494DF}">
-                <a14:hiddenLine xmlns="" xmlns:p14="http://schemas.microsoft.com/office/powerpoint/2010/main" xmlns:a14="http://schemas.microsoft.com/office/drawing/2010/main" w="9525">
+                <a14:hiddenLine xmlns:a14="http://schemas.microsoft.com/office/drawing/2010/main" xmlns:p14="http://schemas.microsoft.com/office/powerpoint/2010/main" xmlns="" w="9525">
                   <a:solidFill>
                     <a:srgbClr val="000000"/>
                   </a:solidFill>
@@ -18530,7 +18555,7 @@
             </a:ln>
             <a:extLst>
               <a:ext uri="{91240B29-F687-4f45-9708-019B960494DF}">
-                <a14:hiddenLine xmlns="" xmlns:p14="http://schemas.microsoft.com/office/powerpoint/2010/main" xmlns:a14="http://schemas.microsoft.com/office/drawing/2010/main" w="9525">
+                <a14:hiddenLine xmlns:a14="http://schemas.microsoft.com/office/drawing/2010/main" xmlns:p14="http://schemas.microsoft.com/office/powerpoint/2010/main" xmlns="" w="9525">
                   <a:solidFill>
                     <a:srgbClr val="000000"/>
                   </a:solidFill>
@@ -18610,7 +18635,7 @@
             </a:ln>
             <a:extLst>
               <a:ext uri="{91240B29-F687-4f45-9708-019B960494DF}">
-                <a14:hiddenLine xmlns="" xmlns:p14="http://schemas.microsoft.com/office/powerpoint/2010/main" xmlns:a14="http://schemas.microsoft.com/office/drawing/2010/main" w="9525">
+                <a14:hiddenLine xmlns:a14="http://schemas.microsoft.com/office/drawing/2010/main" xmlns:p14="http://schemas.microsoft.com/office/powerpoint/2010/main" xmlns="" w="9525">
                   <a:solidFill>
                     <a:srgbClr val="000000"/>
                   </a:solidFill>
@@ -18712,7 +18737,7 @@
             </a:ln>
             <a:extLst>
               <a:ext uri="{91240B29-F687-4f45-9708-019B960494DF}">
-                <a14:hiddenLine xmlns="" xmlns:p14="http://schemas.microsoft.com/office/powerpoint/2010/main" xmlns:a14="http://schemas.microsoft.com/office/drawing/2010/main" w="9525">
+                <a14:hiddenLine xmlns:a14="http://schemas.microsoft.com/office/drawing/2010/main" xmlns:p14="http://schemas.microsoft.com/office/powerpoint/2010/main" xmlns="" w="9525">
                   <a:solidFill>
                     <a:srgbClr val="000000"/>
                   </a:solidFill>
@@ -18792,7 +18817,7 @@
             </a:ln>
             <a:extLst>
               <a:ext uri="{91240B29-F687-4f45-9708-019B960494DF}">
-                <a14:hiddenLine xmlns="" xmlns:p14="http://schemas.microsoft.com/office/powerpoint/2010/main" xmlns:a14="http://schemas.microsoft.com/office/drawing/2010/main" w="9525">
+                <a14:hiddenLine xmlns:a14="http://schemas.microsoft.com/office/drawing/2010/main" xmlns:p14="http://schemas.microsoft.com/office/powerpoint/2010/main" xmlns="" w="9525">
                   <a:solidFill>
                     <a:srgbClr val="000000"/>
                   </a:solidFill>
@@ -18894,7 +18919,7 @@
             </a:ln>
             <a:extLst>
               <a:ext uri="{91240B29-F687-4f45-9708-019B960494DF}">
-                <a14:hiddenLine xmlns="" xmlns:p14="http://schemas.microsoft.com/office/powerpoint/2010/main" xmlns:a14="http://schemas.microsoft.com/office/drawing/2010/main" w="9525">
+                <a14:hiddenLine xmlns:a14="http://schemas.microsoft.com/office/drawing/2010/main" xmlns:p14="http://schemas.microsoft.com/office/powerpoint/2010/main" xmlns="" w="9525">
                   <a:solidFill>
                     <a:srgbClr val="000000"/>
                   </a:solidFill>
@@ -18940,7 +18965,7 @@
             </a:ln>
             <a:extLst>
               <a:ext uri="{91240B29-F687-4f45-9708-019B960494DF}">
-                <a14:hiddenLine xmlns="" xmlns:p14="http://schemas.microsoft.com/office/powerpoint/2010/main" xmlns:a14="http://schemas.microsoft.com/office/drawing/2010/main" w="9525">
+                <a14:hiddenLine xmlns:a14="http://schemas.microsoft.com/office/drawing/2010/main" xmlns:p14="http://schemas.microsoft.com/office/powerpoint/2010/main" xmlns="" w="9525">
                   <a:solidFill>
                     <a:srgbClr val="000000"/>
                   </a:solidFill>
@@ -19042,7 +19067,7 @@
             </a:ln>
             <a:extLst>
               <a:ext uri="{91240B29-F687-4f45-9708-019B960494DF}">
-                <a14:hiddenLine xmlns="" xmlns:p14="http://schemas.microsoft.com/office/powerpoint/2010/main" xmlns:a14="http://schemas.microsoft.com/office/drawing/2010/main" w="9525">
+                <a14:hiddenLine xmlns:a14="http://schemas.microsoft.com/office/drawing/2010/main" xmlns:p14="http://schemas.microsoft.com/office/powerpoint/2010/main" xmlns="" w="9525">
                   <a:solidFill>
                     <a:srgbClr val="000000"/>
                   </a:solidFill>
@@ -19116,7 +19141,7 @@
             </a:ln>
             <a:extLst>
               <a:ext uri="{91240B29-F687-4f45-9708-019B960494DF}">
-                <a14:hiddenLine xmlns="" xmlns:p14="http://schemas.microsoft.com/office/powerpoint/2010/main" xmlns:a14="http://schemas.microsoft.com/office/drawing/2010/main" w="9525">
+                <a14:hiddenLine xmlns:a14="http://schemas.microsoft.com/office/drawing/2010/main" xmlns:p14="http://schemas.microsoft.com/office/powerpoint/2010/main" xmlns="" w="9525">
                   <a:solidFill>
                     <a:srgbClr val="000000"/>
                   </a:solidFill>
@@ -19190,7 +19215,7 @@
             </a:ln>
             <a:extLst>
               <a:ext uri="{91240B29-F687-4f45-9708-019B960494DF}">
-                <a14:hiddenLine xmlns="" xmlns:p14="http://schemas.microsoft.com/office/powerpoint/2010/main" xmlns:a14="http://schemas.microsoft.com/office/drawing/2010/main" w="9525">
+                <a14:hiddenLine xmlns:a14="http://schemas.microsoft.com/office/drawing/2010/main" xmlns:p14="http://schemas.microsoft.com/office/powerpoint/2010/main" xmlns="" w="9525">
                   <a:solidFill>
                     <a:srgbClr val="000000"/>
                   </a:solidFill>
@@ -19292,7 +19317,7 @@
             </a:ln>
             <a:extLst>
               <a:ext uri="{91240B29-F687-4f45-9708-019B960494DF}">
-                <a14:hiddenLine xmlns="" xmlns:p14="http://schemas.microsoft.com/office/powerpoint/2010/main" xmlns:a14="http://schemas.microsoft.com/office/drawing/2010/main" w="9525">
+                <a14:hiddenLine xmlns:a14="http://schemas.microsoft.com/office/drawing/2010/main" xmlns:p14="http://schemas.microsoft.com/office/powerpoint/2010/main" xmlns="" w="9525">
                   <a:solidFill>
                     <a:srgbClr val="000000"/>
                   </a:solidFill>
@@ -19372,7 +19397,7 @@
             </a:ln>
             <a:extLst>
               <a:ext uri="{91240B29-F687-4f45-9708-019B960494DF}">
-                <a14:hiddenLine xmlns="" xmlns:p14="http://schemas.microsoft.com/office/powerpoint/2010/main" xmlns:a14="http://schemas.microsoft.com/office/drawing/2010/main" w="9525">
+                <a14:hiddenLine xmlns:a14="http://schemas.microsoft.com/office/drawing/2010/main" xmlns:p14="http://schemas.microsoft.com/office/powerpoint/2010/main" xmlns="" w="9525">
                   <a:solidFill>
                     <a:srgbClr val="000000"/>
                   </a:solidFill>
@@ -19446,7 +19471,7 @@
             </a:ln>
             <a:extLst>
               <a:ext uri="{91240B29-F687-4f45-9708-019B960494DF}">
-                <a14:hiddenLine xmlns="" xmlns:p14="http://schemas.microsoft.com/office/powerpoint/2010/main" xmlns:a14="http://schemas.microsoft.com/office/drawing/2010/main" w="9525">
+                <a14:hiddenLine xmlns:a14="http://schemas.microsoft.com/office/drawing/2010/main" xmlns:p14="http://schemas.microsoft.com/office/powerpoint/2010/main" xmlns="" w="9525">
                   <a:solidFill>
                     <a:srgbClr val="000000"/>
                   </a:solidFill>
@@ -19548,7 +19573,7 @@
             </a:ln>
             <a:extLst>
               <a:ext uri="{91240B29-F687-4f45-9708-019B960494DF}">
-                <a14:hiddenLine xmlns="" xmlns:p14="http://schemas.microsoft.com/office/powerpoint/2010/main" xmlns:a14="http://schemas.microsoft.com/office/drawing/2010/main" w="9525">
+                <a14:hiddenLine xmlns:a14="http://schemas.microsoft.com/office/drawing/2010/main" xmlns:p14="http://schemas.microsoft.com/office/powerpoint/2010/main" xmlns="" w="9525">
                   <a:solidFill>
                     <a:srgbClr val="000000"/>
                   </a:solidFill>
@@ -19622,7 +19647,7 @@
             </a:ln>
             <a:extLst>
               <a:ext uri="{91240B29-F687-4f45-9708-019B960494DF}">
-                <a14:hiddenLine xmlns="" xmlns:p14="http://schemas.microsoft.com/office/powerpoint/2010/main" xmlns:a14="http://schemas.microsoft.com/office/drawing/2010/main" w="9525">
+                <a14:hiddenLine xmlns:a14="http://schemas.microsoft.com/office/drawing/2010/main" xmlns:p14="http://schemas.microsoft.com/office/powerpoint/2010/main" xmlns="" w="9525">
                   <a:solidFill>
                     <a:srgbClr val="000000"/>
                   </a:solidFill>
@@ -19724,7 +19749,7 @@
             </a:ln>
             <a:extLst>
               <a:ext uri="{91240B29-F687-4f45-9708-019B960494DF}">
-                <a14:hiddenLine xmlns="" xmlns:p14="http://schemas.microsoft.com/office/powerpoint/2010/main" xmlns:a14="http://schemas.microsoft.com/office/drawing/2010/main" w="9525">
+                <a14:hiddenLine xmlns:a14="http://schemas.microsoft.com/office/drawing/2010/main" xmlns:p14="http://schemas.microsoft.com/office/powerpoint/2010/main" xmlns="" w="9525">
                   <a:solidFill>
                     <a:srgbClr val="000000"/>
                   </a:solidFill>
@@ -19798,7 +19823,7 @@
             </a:ln>
             <a:extLst>
               <a:ext uri="{91240B29-F687-4f45-9708-019B960494DF}">
-                <a14:hiddenLine xmlns="" xmlns:p14="http://schemas.microsoft.com/office/powerpoint/2010/main" xmlns:a14="http://schemas.microsoft.com/office/drawing/2010/main" w="9525">
+                <a14:hiddenLine xmlns:a14="http://schemas.microsoft.com/office/drawing/2010/main" xmlns:p14="http://schemas.microsoft.com/office/powerpoint/2010/main" xmlns="" w="9525">
                   <a:solidFill>
                     <a:srgbClr val="000000"/>
                   </a:solidFill>
@@ -19900,7 +19925,7 @@
             </a:ln>
             <a:extLst>
               <a:ext uri="{91240B29-F687-4f45-9708-019B960494DF}">
-                <a14:hiddenLine xmlns="" xmlns:p14="http://schemas.microsoft.com/office/powerpoint/2010/main" xmlns:a14="http://schemas.microsoft.com/office/drawing/2010/main" w="9525">
+                <a14:hiddenLine xmlns:a14="http://schemas.microsoft.com/office/drawing/2010/main" xmlns:p14="http://schemas.microsoft.com/office/powerpoint/2010/main" xmlns="" w="9525">
                   <a:solidFill>
                     <a:srgbClr val="000000"/>
                   </a:solidFill>
@@ -19946,7 +19971,7 @@
             </a:ln>
             <a:extLst>
               <a:ext uri="{91240B29-F687-4f45-9708-019B960494DF}">
-                <a14:hiddenLine xmlns="" xmlns:p14="http://schemas.microsoft.com/office/powerpoint/2010/main" xmlns:a14="http://schemas.microsoft.com/office/drawing/2010/main" w="9525">
+                <a14:hiddenLine xmlns:a14="http://schemas.microsoft.com/office/drawing/2010/main" xmlns:p14="http://schemas.microsoft.com/office/powerpoint/2010/main" xmlns="" w="9525">
                   <a:solidFill>
                     <a:srgbClr val="000000"/>
                   </a:solidFill>
@@ -20023,7 +20048,7 @@
             </a:ln>
             <a:extLst>
               <a:ext uri="{91240B29-F687-4f45-9708-019B960494DF}">
-                <a14:hiddenLine xmlns="" xmlns:p14="http://schemas.microsoft.com/office/powerpoint/2010/main" xmlns:a14="http://schemas.microsoft.com/office/drawing/2010/main" w="9525">
+                <a14:hiddenLine xmlns:a14="http://schemas.microsoft.com/office/drawing/2010/main" xmlns:p14="http://schemas.microsoft.com/office/powerpoint/2010/main" xmlns="" w="9525">
                   <a:solidFill>
                     <a:srgbClr val="000000"/>
                   </a:solidFill>
@@ -20125,7 +20150,7 @@
             </a:ln>
             <a:extLst>
               <a:ext uri="{91240B29-F687-4f45-9708-019B960494DF}">
-                <a14:hiddenLine xmlns="" xmlns:p14="http://schemas.microsoft.com/office/powerpoint/2010/main" xmlns:a14="http://schemas.microsoft.com/office/drawing/2010/main" w="9525">
+                <a14:hiddenLine xmlns:a14="http://schemas.microsoft.com/office/drawing/2010/main" xmlns:p14="http://schemas.microsoft.com/office/powerpoint/2010/main" xmlns="" w="9525">
                   <a:solidFill>
                     <a:srgbClr val="000000"/>
                   </a:solidFill>
@@ -20199,7 +20224,7 @@
             </a:ln>
             <a:extLst>
               <a:ext uri="{91240B29-F687-4f45-9708-019B960494DF}">
-                <a14:hiddenLine xmlns="" xmlns:p14="http://schemas.microsoft.com/office/powerpoint/2010/main" xmlns:a14="http://schemas.microsoft.com/office/drawing/2010/main" w="9525">
+                <a14:hiddenLine xmlns:a14="http://schemas.microsoft.com/office/drawing/2010/main" xmlns:p14="http://schemas.microsoft.com/office/powerpoint/2010/main" xmlns="" w="9525">
                   <a:solidFill>
                     <a:srgbClr val="000000"/>
                   </a:solidFill>
@@ -20301,7 +20326,7 @@
             </a:ln>
             <a:extLst>
               <a:ext uri="{91240B29-F687-4f45-9708-019B960494DF}">
-                <a14:hiddenLine xmlns="" xmlns:p14="http://schemas.microsoft.com/office/powerpoint/2010/main" xmlns:a14="http://schemas.microsoft.com/office/drawing/2010/main" w="9525">
+                <a14:hiddenLine xmlns:a14="http://schemas.microsoft.com/office/drawing/2010/main" xmlns:p14="http://schemas.microsoft.com/office/powerpoint/2010/main" xmlns="" w="9525">
                   <a:solidFill>
                     <a:srgbClr val="000000"/>
                   </a:solidFill>
@@ -20403,7 +20428,7 @@
             </a:ln>
             <a:extLst>
               <a:ext uri="{91240B29-F687-4f45-9708-019B960494DF}">
-                <a14:hiddenLine xmlns="" xmlns:p14="http://schemas.microsoft.com/office/powerpoint/2010/main" xmlns:a14="http://schemas.microsoft.com/office/drawing/2010/main" w="9525">
+                <a14:hiddenLine xmlns:a14="http://schemas.microsoft.com/office/drawing/2010/main" xmlns:p14="http://schemas.microsoft.com/office/powerpoint/2010/main" xmlns="" w="9525">
                   <a:solidFill>
                     <a:srgbClr val="000000"/>
                   </a:solidFill>
@@ -20480,7 +20505,7 @@
             </a:ln>
             <a:extLst>
               <a:ext uri="{91240B29-F687-4f45-9708-019B960494DF}">
-                <a14:hiddenLine xmlns="" xmlns:p14="http://schemas.microsoft.com/office/powerpoint/2010/main" xmlns:a14="http://schemas.microsoft.com/office/drawing/2010/main" w="9525">
+                <a14:hiddenLine xmlns:a14="http://schemas.microsoft.com/office/drawing/2010/main" xmlns:p14="http://schemas.microsoft.com/office/powerpoint/2010/main" xmlns="" w="9525">
                   <a:solidFill>
                     <a:srgbClr val="000000"/>
                   </a:solidFill>
@@ -20554,7 +20579,7 @@
             </a:ln>
             <a:extLst>
               <a:ext uri="{91240B29-F687-4f45-9708-019B960494DF}">
-                <a14:hiddenLine xmlns="" xmlns:p14="http://schemas.microsoft.com/office/powerpoint/2010/main" xmlns:a14="http://schemas.microsoft.com/office/drawing/2010/main" w="9525">
+                <a14:hiddenLine xmlns:a14="http://schemas.microsoft.com/office/drawing/2010/main" xmlns:p14="http://schemas.microsoft.com/office/powerpoint/2010/main" xmlns="" w="9525">
                   <a:solidFill>
                     <a:srgbClr val="000000"/>
                   </a:solidFill>
@@ -20656,7 +20681,7 @@
             </a:ln>
             <a:extLst>
               <a:ext uri="{91240B29-F687-4f45-9708-019B960494DF}">
-                <a14:hiddenLine xmlns="" xmlns:p14="http://schemas.microsoft.com/office/powerpoint/2010/main" xmlns:a14="http://schemas.microsoft.com/office/drawing/2010/main" w="9525">
+                <a14:hiddenLine xmlns:a14="http://schemas.microsoft.com/office/drawing/2010/main" xmlns:p14="http://schemas.microsoft.com/office/powerpoint/2010/main" xmlns="" w="9525">
                   <a:solidFill>
                     <a:srgbClr val="000000"/>
                   </a:solidFill>
@@ -20758,7 +20783,7 @@
             </a:ln>
             <a:extLst>
               <a:ext uri="{91240B29-F687-4f45-9708-019B960494DF}">
-                <a14:hiddenLine xmlns="" xmlns:p14="http://schemas.microsoft.com/office/powerpoint/2010/main" xmlns:a14="http://schemas.microsoft.com/office/drawing/2010/main" w="9525">
+                <a14:hiddenLine xmlns:a14="http://schemas.microsoft.com/office/drawing/2010/main" xmlns:p14="http://schemas.microsoft.com/office/powerpoint/2010/main" xmlns="" w="9525">
                   <a:solidFill>
                     <a:srgbClr val="000000"/>
                   </a:solidFill>
@@ -20832,7 +20857,7 @@
             </a:ln>
             <a:extLst>
               <a:ext uri="{91240B29-F687-4f45-9708-019B960494DF}">
-                <a14:hiddenLine xmlns="" xmlns:p14="http://schemas.microsoft.com/office/powerpoint/2010/main" xmlns:a14="http://schemas.microsoft.com/office/drawing/2010/main" w="9525">
+                <a14:hiddenLine xmlns:a14="http://schemas.microsoft.com/office/drawing/2010/main" xmlns:p14="http://schemas.microsoft.com/office/powerpoint/2010/main" xmlns="" w="9525">
                   <a:solidFill>
                     <a:srgbClr val="000000"/>
                   </a:solidFill>
@@ -20964,7 +20989,7 @@
             </a:ln>
             <a:extLst>
               <a:ext uri="{91240B29-F687-4f45-9708-019B960494DF}">
-                <a14:hiddenLine xmlns="" xmlns:p14="http://schemas.microsoft.com/office/powerpoint/2010/main" xmlns:a14="http://schemas.microsoft.com/office/drawing/2010/main" w="9525">
+                <a14:hiddenLine xmlns:a14="http://schemas.microsoft.com/office/drawing/2010/main" xmlns:p14="http://schemas.microsoft.com/office/powerpoint/2010/main" xmlns="" w="9525">
                   <a:solidFill>
                     <a:srgbClr val="000000"/>
                   </a:solidFill>
@@ -21044,7 +21069,7 @@
             </a:ln>
             <a:extLst>
               <a:ext uri="{91240B29-F687-4f45-9708-019B960494DF}">
-                <a14:hiddenLine xmlns="" xmlns:p14="http://schemas.microsoft.com/office/powerpoint/2010/main" xmlns:a14="http://schemas.microsoft.com/office/drawing/2010/main" w="9525">
+                <a14:hiddenLine xmlns:a14="http://schemas.microsoft.com/office/drawing/2010/main" xmlns:p14="http://schemas.microsoft.com/office/powerpoint/2010/main" xmlns="" w="9525">
                   <a:solidFill>
                     <a:srgbClr val="000000"/>
                   </a:solidFill>
@@ -21146,7 +21171,7 @@
             </a:ln>
             <a:extLst>
               <a:ext uri="{91240B29-F687-4f45-9708-019B960494DF}">
-                <a14:hiddenLine xmlns="" xmlns:p14="http://schemas.microsoft.com/office/powerpoint/2010/main" xmlns:a14="http://schemas.microsoft.com/office/drawing/2010/main" w="9525">
+                <a14:hiddenLine xmlns:a14="http://schemas.microsoft.com/office/drawing/2010/main" xmlns:p14="http://schemas.microsoft.com/office/powerpoint/2010/main" xmlns="" w="9525">
                   <a:solidFill>
                     <a:srgbClr val="000000"/>
                   </a:solidFill>
@@ -22143,7 +22168,7 @@
           <a:noFill/>
           <a:extLst>
             <a:ext uri="{909E8E84-426E-40dd-AFC4-6F175D3DCCD1}">
-              <a14:hiddenFill xmlns="" xmlns:p14="http://schemas.microsoft.com/office/powerpoint/2010/main" xmlns:a14="http://schemas.microsoft.com/office/drawing/2010/main">
+              <a14:hiddenFill xmlns:a14="http://schemas.microsoft.com/office/drawing/2010/main" xmlns:p14="http://schemas.microsoft.com/office/powerpoint/2010/main" xmlns="">
                 <a:solidFill>
                   <a:srgbClr val="FFFFFF"/>
                 </a:solidFill>
@@ -22255,7 +22280,7 @@
               </a:ln>
               <a:extLst>
                 <a:ext uri="{91240B29-F687-4f45-9708-019B960494DF}">
-                  <a14:hiddenLine xmlns="" xmlns:p14="http://schemas.microsoft.com/office/powerpoint/2010/main" xmlns:a14="http://schemas.microsoft.com/office/drawing/2010/main" w="9525">
+                  <a14:hiddenLine xmlns:a14="http://schemas.microsoft.com/office/drawing/2010/main" xmlns:p14="http://schemas.microsoft.com/office/powerpoint/2010/main" xmlns="" w="9525">
                     <a:solidFill>
                       <a:srgbClr val="000000"/>
                     </a:solidFill>
@@ -22357,7 +22382,7 @@
               </a:ln>
               <a:extLst>
                 <a:ext uri="{91240B29-F687-4f45-9708-019B960494DF}">
-                  <a14:hiddenLine xmlns="" xmlns:p14="http://schemas.microsoft.com/office/powerpoint/2010/main" xmlns:a14="http://schemas.microsoft.com/office/drawing/2010/main" w="9525">
+                  <a14:hiddenLine xmlns:a14="http://schemas.microsoft.com/office/drawing/2010/main" xmlns:p14="http://schemas.microsoft.com/office/powerpoint/2010/main" xmlns="" w="9525">
                     <a:solidFill>
                       <a:srgbClr val="000000"/>
                     </a:solidFill>
@@ -22459,7 +22484,7 @@
               </a:ln>
               <a:extLst>
                 <a:ext uri="{91240B29-F687-4f45-9708-019B960494DF}">
-                  <a14:hiddenLine xmlns="" xmlns:p14="http://schemas.microsoft.com/office/powerpoint/2010/main" xmlns:a14="http://schemas.microsoft.com/office/drawing/2010/main" w="9525">
+                  <a14:hiddenLine xmlns:a14="http://schemas.microsoft.com/office/drawing/2010/main" xmlns:p14="http://schemas.microsoft.com/office/powerpoint/2010/main" xmlns="" w="9525">
                     <a:solidFill>
                       <a:srgbClr val="000000"/>
                     </a:solidFill>
@@ -22533,7 +22558,7 @@
               </a:ln>
               <a:extLst>
                 <a:ext uri="{91240B29-F687-4f45-9708-019B960494DF}">
-                  <a14:hiddenLine xmlns="" xmlns:p14="http://schemas.microsoft.com/office/powerpoint/2010/main" xmlns:a14="http://schemas.microsoft.com/office/drawing/2010/main" w="9525">
+                  <a14:hiddenLine xmlns:a14="http://schemas.microsoft.com/office/drawing/2010/main" xmlns:p14="http://schemas.microsoft.com/office/powerpoint/2010/main" xmlns="" w="9525">
                     <a:solidFill>
                       <a:srgbClr val="000000"/>
                     </a:solidFill>
@@ -22635,7 +22660,7 @@
               </a:ln>
               <a:extLst>
                 <a:ext uri="{91240B29-F687-4f45-9708-019B960494DF}">
-                  <a14:hiddenLine xmlns="" xmlns:p14="http://schemas.microsoft.com/office/powerpoint/2010/main" xmlns:a14="http://schemas.microsoft.com/office/drawing/2010/main" w="9525">
+                  <a14:hiddenLine xmlns:a14="http://schemas.microsoft.com/office/drawing/2010/main" xmlns:p14="http://schemas.microsoft.com/office/powerpoint/2010/main" xmlns="" w="9525">
                     <a:solidFill>
                       <a:srgbClr val="000000"/>
                     </a:solidFill>
@@ -22709,7 +22734,7 @@
               </a:ln>
               <a:extLst>
                 <a:ext uri="{91240B29-F687-4f45-9708-019B960494DF}">
-                  <a14:hiddenLine xmlns="" xmlns:p14="http://schemas.microsoft.com/office/powerpoint/2010/main" xmlns:a14="http://schemas.microsoft.com/office/drawing/2010/main" w="9525">
+                  <a14:hiddenLine xmlns:a14="http://schemas.microsoft.com/office/drawing/2010/main" xmlns:p14="http://schemas.microsoft.com/office/powerpoint/2010/main" xmlns="" w="9525">
                     <a:solidFill>
                       <a:srgbClr val="000000"/>
                     </a:solidFill>
@@ -22783,7 +22808,7 @@
               </a:ln>
               <a:extLst>
                 <a:ext uri="{91240B29-F687-4f45-9708-019B960494DF}">
-                  <a14:hiddenLine xmlns="" xmlns:p14="http://schemas.microsoft.com/office/powerpoint/2010/main" xmlns:a14="http://schemas.microsoft.com/office/drawing/2010/main" w="9525">
+                  <a14:hiddenLine xmlns:a14="http://schemas.microsoft.com/office/drawing/2010/main" xmlns:p14="http://schemas.microsoft.com/office/powerpoint/2010/main" xmlns="" w="9525">
                     <a:solidFill>
                       <a:srgbClr val="000000"/>
                     </a:solidFill>
@@ -22885,7 +22910,7 @@
               </a:ln>
               <a:extLst>
                 <a:ext uri="{91240B29-F687-4f45-9708-019B960494DF}">
-                  <a14:hiddenLine xmlns="" xmlns:p14="http://schemas.microsoft.com/office/powerpoint/2010/main" xmlns:a14="http://schemas.microsoft.com/office/drawing/2010/main" w="9525">
+                  <a14:hiddenLine xmlns:a14="http://schemas.microsoft.com/office/drawing/2010/main" xmlns:p14="http://schemas.microsoft.com/office/powerpoint/2010/main" xmlns="" w="9525">
                     <a:solidFill>
                       <a:srgbClr val="000000"/>
                     </a:solidFill>
@@ -22987,7 +23012,7 @@
               </a:ln>
               <a:extLst>
                 <a:ext uri="{91240B29-F687-4f45-9708-019B960494DF}">
-                  <a14:hiddenLine xmlns="" xmlns:p14="http://schemas.microsoft.com/office/powerpoint/2010/main" xmlns:a14="http://schemas.microsoft.com/office/drawing/2010/main" w="9525">
+                  <a14:hiddenLine xmlns:a14="http://schemas.microsoft.com/office/drawing/2010/main" xmlns:p14="http://schemas.microsoft.com/office/powerpoint/2010/main" xmlns="" w="9525">
                     <a:solidFill>
                       <a:srgbClr val="000000"/>
                     </a:solidFill>
@@ -23061,7 +23086,7 @@
               </a:ln>
               <a:extLst>
                 <a:ext uri="{91240B29-F687-4f45-9708-019B960494DF}">
-                  <a14:hiddenLine xmlns="" xmlns:p14="http://schemas.microsoft.com/office/powerpoint/2010/main" xmlns:a14="http://schemas.microsoft.com/office/drawing/2010/main" w="9525">
+                  <a14:hiddenLine xmlns:a14="http://schemas.microsoft.com/office/drawing/2010/main" xmlns:p14="http://schemas.microsoft.com/office/powerpoint/2010/main" xmlns="" w="9525">
                     <a:solidFill>
                       <a:srgbClr val="000000"/>
                     </a:solidFill>
@@ -23183,7 +23208,7 @@
               </a:ln>
               <a:extLst>
                 <a:ext uri="{91240B29-F687-4f45-9708-019B960494DF}">
-                  <a14:hiddenLine xmlns="" xmlns:p14="http://schemas.microsoft.com/office/powerpoint/2010/main" xmlns:a14="http://schemas.microsoft.com/office/drawing/2010/main" w="9525">
+                  <a14:hiddenLine xmlns:a14="http://schemas.microsoft.com/office/drawing/2010/main" xmlns:p14="http://schemas.microsoft.com/office/powerpoint/2010/main" xmlns="" w="9525">
                     <a:solidFill>
                       <a:srgbClr val="000000"/>
                     </a:solidFill>
@@ -23291,7 +23316,7 @@
               </a:ln>
               <a:extLst>
                 <a:ext uri="{91240B29-F687-4f45-9708-019B960494DF}">
-                  <a14:hiddenLine xmlns="" xmlns:p14="http://schemas.microsoft.com/office/powerpoint/2010/main" xmlns:a14="http://schemas.microsoft.com/office/drawing/2010/main" w="9525">
+                  <a14:hiddenLine xmlns:a14="http://schemas.microsoft.com/office/drawing/2010/main" xmlns:p14="http://schemas.microsoft.com/office/powerpoint/2010/main" xmlns="" w="9525">
                     <a:solidFill>
                       <a:srgbClr val="000000"/>
                     </a:solidFill>
@@ -23365,7 +23390,7 @@
               </a:ln>
               <a:extLst>
                 <a:ext uri="{91240B29-F687-4f45-9708-019B960494DF}">
-                  <a14:hiddenLine xmlns="" xmlns:p14="http://schemas.microsoft.com/office/powerpoint/2010/main" xmlns:a14="http://schemas.microsoft.com/office/drawing/2010/main" w="9525">
+                  <a14:hiddenLine xmlns:a14="http://schemas.microsoft.com/office/drawing/2010/main" xmlns:p14="http://schemas.microsoft.com/office/powerpoint/2010/main" xmlns="" w="9525">
                     <a:solidFill>
                       <a:srgbClr val="000000"/>
                     </a:solidFill>
@@ -23439,7 +23464,7 @@
               </a:ln>
               <a:extLst>
                 <a:ext uri="{91240B29-F687-4f45-9708-019B960494DF}">
-                  <a14:hiddenLine xmlns="" xmlns:p14="http://schemas.microsoft.com/office/powerpoint/2010/main" xmlns:a14="http://schemas.microsoft.com/office/drawing/2010/main" w="9525">
+                  <a14:hiddenLine xmlns:a14="http://schemas.microsoft.com/office/drawing/2010/main" xmlns:p14="http://schemas.microsoft.com/office/powerpoint/2010/main" xmlns="" w="9525">
                     <a:solidFill>
                       <a:srgbClr val="000000"/>
                     </a:solidFill>
@@ -23541,7 +23566,7 @@
               </a:ln>
               <a:extLst>
                 <a:ext uri="{91240B29-F687-4f45-9708-019B960494DF}">
-                  <a14:hiddenLine xmlns="" xmlns:p14="http://schemas.microsoft.com/office/powerpoint/2010/main" xmlns:a14="http://schemas.microsoft.com/office/drawing/2010/main" w="9525">
+                  <a14:hiddenLine xmlns:a14="http://schemas.microsoft.com/office/drawing/2010/main" xmlns:p14="http://schemas.microsoft.com/office/powerpoint/2010/main" xmlns="" w="9525">
                     <a:solidFill>
                       <a:srgbClr val="000000"/>
                     </a:solidFill>
@@ -23587,7 +23612,7 @@
               </a:ln>
               <a:extLst>
                 <a:ext uri="{91240B29-F687-4f45-9708-019B960494DF}">
-                  <a14:hiddenLine xmlns="" xmlns:p14="http://schemas.microsoft.com/office/powerpoint/2010/main" xmlns:a14="http://schemas.microsoft.com/office/drawing/2010/main" w="9525">
+                  <a14:hiddenLine xmlns:a14="http://schemas.microsoft.com/office/drawing/2010/main" xmlns:p14="http://schemas.microsoft.com/office/powerpoint/2010/main" xmlns="" w="9525">
                     <a:solidFill>
                       <a:srgbClr val="000000"/>
                     </a:solidFill>
@@ -23664,7 +23689,7 @@
               </a:ln>
               <a:extLst>
                 <a:ext uri="{91240B29-F687-4f45-9708-019B960494DF}">
-                  <a14:hiddenLine xmlns="" xmlns:p14="http://schemas.microsoft.com/office/powerpoint/2010/main" xmlns:a14="http://schemas.microsoft.com/office/drawing/2010/main" w="9525">
+                  <a14:hiddenLine xmlns:a14="http://schemas.microsoft.com/office/drawing/2010/main" xmlns:p14="http://schemas.microsoft.com/office/powerpoint/2010/main" xmlns="" w="9525">
                     <a:solidFill>
                       <a:srgbClr val="000000"/>
                     </a:solidFill>
@@ -23766,7 +23791,7 @@
               </a:ln>
               <a:extLst>
                 <a:ext uri="{91240B29-F687-4f45-9708-019B960494DF}">
-                  <a14:hiddenLine xmlns="" xmlns:p14="http://schemas.microsoft.com/office/powerpoint/2010/main" xmlns:a14="http://schemas.microsoft.com/office/drawing/2010/main" w="9525">
+                  <a14:hiddenLine xmlns:a14="http://schemas.microsoft.com/office/drawing/2010/main" xmlns:p14="http://schemas.microsoft.com/office/powerpoint/2010/main" xmlns="" w="9525">
                     <a:solidFill>
                       <a:srgbClr val="000000"/>
                     </a:solidFill>
@@ -23840,7 +23865,7 @@
               </a:ln>
               <a:extLst>
                 <a:ext uri="{91240B29-F687-4f45-9708-019B960494DF}">
-                  <a14:hiddenLine xmlns="" xmlns:p14="http://schemas.microsoft.com/office/powerpoint/2010/main" xmlns:a14="http://schemas.microsoft.com/office/drawing/2010/main" w="9525">
+                  <a14:hiddenLine xmlns:a14="http://schemas.microsoft.com/office/drawing/2010/main" xmlns:p14="http://schemas.microsoft.com/office/powerpoint/2010/main" xmlns="" w="9525">
                     <a:solidFill>
                       <a:srgbClr val="000000"/>
                     </a:solidFill>
@@ -23942,7 +23967,7 @@
               </a:ln>
               <a:extLst>
                 <a:ext uri="{91240B29-F687-4f45-9708-019B960494DF}">
-                  <a14:hiddenLine xmlns="" xmlns:p14="http://schemas.microsoft.com/office/powerpoint/2010/main" xmlns:a14="http://schemas.microsoft.com/office/drawing/2010/main" w="9525">
+                  <a14:hiddenLine xmlns:a14="http://schemas.microsoft.com/office/drawing/2010/main" xmlns:p14="http://schemas.microsoft.com/office/powerpoint/2010/main" xmlns="" w="9525">
                     <a:solidFill>
                       <a:srgbClr val="000000"/>
                     </a:solidFill>
@@ -24019,7 +24044,7 @@
               </a:ln>
               <a:extLst>
                 <a:ext uri="{91240B29-F687-4f45-9708-019B960494DF}">
-                  <a14:hiddenLine xmlns="" xmlns:p14="http://schemas.microsoft.com/office/powerpoint/2010/main" xmlns:a14="http://schemas.microsoft.com/office/drawing/2010/main" w="9525">
+                  <a14:hiddenLine xmlns:a14="http://schemas.microsoft.com/office/drawing/2010/main" xmlns:p14="http://schemas.microsoft.com/office/powerpoint/2010/main" xmlns="" w="9525">
                     <a:solidFill>
                       <a:srgbClr val="000000"/>
                     </a:solidFill>
@@ -24093,7 +24118,7 @@
               </a:ln>
               <a:extLst>
                 <a:ext uri="{91240B29-F687-4f45-9708-019B960494DF}">
-                  <a14:hiddenLine xmlns="" xmlns:p14="http://schemas.microsoft.com/office/powerpoint/2010/main" xmlns:a14="http://schemas.microsoft.com/office/drawing/2010/main" w="9525">
+                  <a14:hiddenLine xmlns:a14="http://schemas.microsoft.com/office/drawing/2010/main" xmlns:p14="http://schemas.microsoft.com/office/powerpoint/2010/main" xmlns="" w="9525">
                     <a:solidFill>
                       <a:srgbClr val="000000"/>
                     </a:solidFill>
@@ -24195,7 +24220,7 @@
               </a:ln>
               <a:extLst>
                 <a:ext uri="{91240B29-F687-4f45-9708-019B960494DF}">
-                  <a14:hiddenLine xmlns="" xmlns:p14="http://schemas.microsoft.com/office/powerpoint/2010/main" xmlns:a14="http://schemas.microsoft.com/office/drawing/2010/main" w="9525">
+                  <a14:hiddenLine xmlns:a14="http://schemas.microsoft.com/office/drawing/2010/main" xmlns:p14="http://schemas.microsoft.com/office/powerpoint/2010/main" xmlns="" w="9525">
                     <a:solidFill>
                       <a:srgbClr val="000000"/>
                     </a:solidFill>
@@ -24297,7 +24322,7 @@
               </a:ln>
               <a:extLst>
                 <a:ext uri="{91240B29-F687-4f45-9708-019B960494DF}">
-                  <a14:hiddenLine xmlns="" xmlns:p14="http://schemas.microsoft.com/office/powerpoint/2010/main" xmlns:a14="http://schemas.microsoft.com/office/drawing/2010/main" w="9525">
+                  <a14:hiddenLine xmlns:a14="http://schemas.microsoft.com/office/drawing/2010/main" xmlns:p14="http://schemas.microsoft.com/office/powerpoint/2010/main" xmlns="" w="9525">
                     <a:solidFill>
                       <a:srgbClr val="000000"/>
                     </a:solidFill>
@@ -24374,7 +24399,7 @@
               </a:ln>
               <a:extLst>
                 <a:ext uri="{91240B29-F687-4f45-9708-019B960494DF}">
-                  <a14:hiddenLine xmlns="" xmlns:p14="http://schemas.microsoft.com/office/powerpoint/2010/main" xmlns:a14="http://schemas.microsoft.com/office/drawing/2010/main" w="9525">
+                  <a14:hiddenLine xmlns:a14="http://schemas.microsoft.com/office/drawing/2010/main" xmlns:p14="http://schemas.microsoft.com/office/powerpoint/2010/main" xmlns="" w="9525">
                     <a:solidFill>
                       <a:srgbClr val="000000"/>
                     </a:solidFill>
@@ -24506,7 +24531,7 @@
               </a:ln>
               <a:extLst>
                 <a:ext uri="{91240B29-F687-4f45-9708-019B960494DF}">
-                  <a14:hiddenLine xmlns="" xmlns:p14="http://schemas.microsoft.com/office/powerpoint/2010/main" xmlns:a14="http://schemas.microsoft.com/office/drawing/2010/main" w="9525">
+                  <a14:hiddenLine xmlns:a14="http://schemas.microsoft.com/office/drawing/2010/main" xmlns:p14="http://schemas.microsoft.com/office/powerpoint/2010/main" xmlns="" w="9525">
                     <a:solidFill>
                       <a:srgbClr val="000000"/>
                     </a:solidFill>
@@ -24628,7 +24653,7 @@
               </a:ln>
               <a:extLst>
                 <a:ext uri="{91240B29-F687-4f45-9708-019B960494DF}">
-                  <a14:hiddenLine xmlns="" xmlns:p14="http://schemas.microsoft.com/office/powerpoint/2010/main" xmlns:a14="http://schemas.microsoft.com/office/drawing/2010/main" w="9525">
+                  <a14:hiddenLine xmlns:a14="http://schemas.microsoft.com/office/drawing/2010/main" xmlns:p14="http://schemas.microsoft.com/office/powerpoint/2010/main" xmlns="" w="9525">
                     <a:solidFill>
                       <a:srgbClr val="000000"/>
                     </a:solidFill>
@@ -24755,7 +24780,7 @@
               </a:ln>
               <a:extLst>
                 <a:ext uri="{91240B29-F687-4f45-9708-019B960494DF}">
-                  <a14:hiddenLine xmlns="" xmlns:p14="http://schemas.microsoft.com/office/powerpoint/2010/main" xmlns:a14="http://schemas.microsoft.com/office/drawing/2010/main" w="9525">
+                  <a14:hiddenLine xmlns:a14="http://schemas.microsoft.com/office/drawing/2010/main" xmlns:p14="http://schemas.microsoft.com/office/powerpoint/2010/main" xmlns="" w="9525">
                     <a:solidFill>
                       <a:srgbClr val="000000"/>
                     </a:solidFill>
@@ -24857,7 +24882,7 @@
               </a:ln>
               <a:extLst>
                 <a:ext uri="{91240B29-F687-4f45-9708-019B960494DF}">
-                  <a14:hiddenLine xmlns="" xmlns:p14="http://schemas.microsoft.com/office/powerpoint/2010/main" xmlns:a14="http://schemas.microsoft.com/office/drawing/2010/main" w="9525">
+                  <a14:hiddenLine xmlns:a14="http://schemas.microsoft.com/office/drawing/2010/main" xmlns:p14="http://schemas.microsoft.com/office/powerpoint/2010/main" xmlns="" w="9525">
                     <a:solidFill>
                       <a:srgbClr val="000000"/>
                     </a:solidFill>
@@ -24934,7 +24959,7 @@
               </a:ln>
               <a:extLst>
                 <a:ext uri="{91240B29-F687-4f45-9708-019B960494DF}">
-                  <a14:hiddenLine xmlns="" xmlns:p14="http://schemas.microsoft.com/office/powerpoint/2010/main" xmlns:a14="http://schemas.microsoft.com/office/drawing/2010/main" w="9525">
+                  <a14:hiddenLine xmlns:a14="http://schemas.microsoft.com/office/drawing/2010/main" xmlns:p14="http://schemas.microsoft.com/office/powerpoint/2010/main" xmlns="" w="9525">
                     <a:solidFill>
                       <a:srgbClr val="000000"/>
                     </a:solidFill>
@@ -25036,7 +25061,7 @@
               </a:ln>
               <a:extLst>
                 <a:ext uri="{91240B29-F687-4f45-9708-019B960494DF}">
-                  <a14:hiddenLine xmlns="" xmlns:p14="http://schemas.microsoft.com/office/powerpoint/2010/main" xmlns:a14="http://schemas.microsoft.com/office/drawing/2010/main" w="9525">
+                  <a14:hiddenLine xmlns:a14="http://schemas.microsoft.com/office/drawing/2010/main" xmlns:p14="http://schemas.microsoft.com/office/powerpoint/2010/main" xmlns="" w="9525">
                     <a:solidFill>
                       <a:srgbClr val="000000"/>
                     </a:solidFill>
@@ -25116,7 +25141,7 @@
               </a:ln>
               <a:extLst>
                 <a:ext uri="{91240B29-F687-4f45-9708-019B960494DF}">
-                  <a14:hiddenLine xmlns="" xmlns:p14="http://schemas.microsoft.com/office/powerpoint/2010/main" xmlns:a14="http://schemas.microsoft.com/office/drawing/2010/main" w="9525">
+                  <a14:hiddenLine xmlns:a14="http://schemas.microsoft.com/office/drawing/2010/main" xmlns:p14="http://schemas.microsoft.com/office/powerpoint/2010/main" xmlns="" w="9525">
                     <a:solidFill>
                       <a:srgbClr val="000000"/>
                     </a:solidFill>
@@ -25218,7 +25243,7 @@
               </a:ln>
               <a:extLst>
                 <a:ext uri="{91240B29-F687-4f45-9708-019B960494DF}">
-                  <a14:hiddenLine xmlns="" xmlns:p14="http://schemas.microsoft.com/office/powerpoint/2010/main" xmlns:a14="http://schemas.microsoft.com/office/drawing/2010/main" w="9525">
+                  <a14:hiddenLine xmlns:a14="http://schemas.microsoft.com/office/drawing/2010/main" xmlns:p14="http://schemas.microsoft.com/office/powerpoint/2010/main" xmlns="" w="9525">
                     <a:solidFill>
                       <a:srgbClr val="000000"/>
                     </a:solidFill>
@@ -25298,7 +25323,7 @@
               </a:ln>
               <a:extLst>
                 <a:ext uri="{91240B29-F687-4f45-9708-019B960494DF}">
-                  <a14:hiddenLine xmlns="" xmlns:p14="http://schemas.microsoft.com/office/powerpoint/2010/main" xmlns:a14="http://schemas.microsoft.com/office/drawing/2010/main" w="9525">
+                  <a14:hiddenLine xmlns:a14="http://schemas.microsoft.com/office/drawing/2010/main" xmlns:p14="http://schemas.microsoft.com/office/powerpoint/2010/main" xmlns="" w="9525">
                     <a:solidFill>
                       <a:srgbClr val="000000"/>
                     </a:solidFill>
@@ -25400,7 +25425,7 @@
               </a:ln>
               <a:extLst>
                 <a:ext uri="{91240B29-F687-4f45-9708-019B960494DF}">
-                  <a14:hiddenLine xmlns="" xmlns:p14="http://schemas.microsoft.com/office/powerpoint/2010/main" xmlns:a14="http://schemas.microsoft.com/office/drawing/2010/main" w="9525">
+                  <a14:hiddenLine xmlns:a14="http://schemas.microsoft.com/office/drawing/2010/main" xmlns:p14="http://schemas.microsoft.com/office/powerpoint/2010/main" xmlns="" w="9525">
                     <a:solidFill>
                       <a:srgbClr val="000000"/>
                     </a:solidFill>
@@ -25446,7 +25471,7 @@
               </a:ln>
               <a:extLst>
                 <a:ext uri="{91240B29-F687-4f45-9708-019B960494DF}">
-                  <a14:hiddenLine xmlns="" xmlns:p14="http://schemas.microsoft.com/office/powerpoint/2010/main" xmlns:a14="http://schemas.microsoft.com/office/drawing/2010/main" w="9525">
+                  <a14:hiddenLine xmlns:a14="http://schemas.microsoft.com/office/drawing/2010/main" xmlns:p14="http://schemas.microsoft.com/office/powerpoint/2010/main" xmlns="" w="9525">
                     <a:solidFill>
                       <a:srgbClr val="000000"/>
                     </a:solidFill>
@@ -25595,7 +25620,7 @@
             <a:noFill/>
             <a:extLst>
               <a:ext uri="{909E8E84-426E-40dd-AFC4-6F175D3DCCD1}">
-                <a14:hiddenFill xmlns="" xmlns:p14="http://schemas.microsoft.com/office/powerpoint/2010/main" xmlns:a14="http://schemas.microsoft.com/office/drawing/2010/main">
+                <a14:hiddenFill xmlns:a14="http://schemas.microsoft.com/office/drawing/2010/main" xmlns:p14="http://schemas.microsoft.com/office/powerpoint/2010/main" xmlns="">
                   <a:solidFill>
                     <a:srgbClr val="FFFFFF"/>
                   </a:solidFill>
@@ -25704,7 +25729,7 @@
             </a:ln>
             <a:extLst>
               <a:ext uri="{91240B29-F687-4f45-9708-019B960494DF}">
-                <a14:hiddenLine xmlns="" xmlns:p14="http://schemas.microsoft.com/office/powerpoint/2010/main" xmlns:a14="http://schemas.microsoft.com/office/drawing/2010/main" w="9525">
+                <a14:hiddenLine xmlns:a14="http://schemas.microsoft.com/office/drawing/2010/main" xmlns:p14="http://schemas.microsoft.com/office/powerpoint/2010/main" xmlns="" w="9525">
                   <a:solidFill>
                     <a:srgbClr val="000000"/>
                   </a:solidFill>
@@ -25806,7 +25831,7 @@
             </a:ln>
             <a:extLst>
               <a:ext uri="{91240B29-F687-4f45-9708-019B960494DF}">
-                <a14:hiddenLine xmlns="" xmlns:p14="http://schemas.microsoft.com/office/powerpoint/2010/main" xmlns:a14="http://schemas.microsoft.com/office/drawing/2010/main" w="9525">
+                <a14:hiddenLine xmlns:a14="http://schemas.microsoft.com/office/drawing/2010/main" xmlns:p14="http://schemas.microsoft.com/office/powerpoint/2010/main" xmlns="" w="9525">
                   <a:solidFill>
                     <a:srgbClr val="000000"/>
                   </a:solidFill>
@@ -25908,7 +25933,7 @@
             </a:ln>
             <a:extLst>
               <a:ext uri="{91240B29-F687-4f45-9708-019B960494DF}">
-                <a14:hiddenLine xmlns="" xmlns:p14="http://schemas.microsoft.com/office/powerpoint/2010/main" xmlns:a14="http://schemas.microsoft.com/office/drawing/2010/main" w="9525">
+                <a14:hiddenLine xmlns:a14="http://schemas.microsoft.com/office/drawing/2010/main" xmlns:p14="http://schemas.microsoft.com/office/powerpoint/2010/main" xmlns="" w="9525">
                   <a:solidFill>
                     <a:srgbClr val="000000"/>
                   </a:solidFill>
@@ -25954,7 +25979,7 @@
             </a:ln>
             <a:extLst>
               <a:ext uri="{91240B29-F687-4f45-9708-019B960494DF}">
-                <a14:hiddenLine xmlns="" xmlns:p14="http://schemas.microsoft.com/office/powerpoint/2010/main" xmlns:a14="http://schemas.microsoft.com/office/drawing/2010/main" w="9525">
+                <a14:hiddenLine xmlns:a14="http://schemas.microsoft.com/office/drawing/2010/main" xmlns:p14="http://schemas.microsoft.com/office/powerpoint/2010/main" xmlns="" w="9525">
                   <a:solidFill>
                     <a:srgbClr val="000000"/>
                   </a:solidFill>
@@ -26056,7 +26081,7 @@
             </a:ln>
             <a:extLst>
               <a:ext uri="{91240B29-F687-4f45-9708-019B960494DF}">
-                <a14:hiddenLine xmlns="" xmlns:p14="http://schemas.microsoft.com/office/powerpoint/2010/main" xmlns:a14="http://schemas.microsoft.com/office/drawing/2010/main" w="9525">
+                <a14:hiddenLine xmlns:a14="http://schemas.microsoft.com/office/drawing/2010/main" xmlns:p14="http://schemas.microsoft.com/office/powerpoint/2010/main" xmlns="" w="9525">
                   <a:solidFill>
                     <a:srgbClr val="000000"/>
                   </a:solidFill>
@@ -26130,7 +26155,7 @@
             </a:ln>
             <a:extLst>
               <a:ext uri="{91240B29-F687-4f45-9708-019B960494DF}">
-                <a14:hiddenLine xmlns="" xmlns:p14="http://schemas.microsoft.com/office/powerpoint/2010/main" xmlns:a14="http://schemas.microsoft.com/office/drawing/2010/main" w="9525">
+                <a14:hiddenLine xmlns:a14="http://schemas.microsoft.com/office/drawing/2010/main" xmlns:p14="http://schemas.microsoft.com/office/powerpoint/2010/main" xmlns="" w="9525">
                   <a:solidFill>
                     <a:srgbClr val="000000"/>
                   </a:solidFill>
@@ -26204,7 +26229,7 @@
             </a:ln>
             <a:extLst>
               <a:ext uri="{91240B29-F687-4f45-9708-019B960494DF}">
-                <a14:hiddenLine xmlns="" xmlns:p14="http://schemas.microsoft.com/office/powerpoint/2010/main" xmlns:a14="http://schemas.microsoft.com/office/drawing/2010/main" w="9525">
+                <a14:hiddenLine xmlns:a14="http://schemas.microsoft.com/office/drawing/2010/main" xmlns:p14="http://schemas.microsoft.com/office/powerpoint/2010/main" xmlns="" w="9525">
                   <a:solidFill>
                     <a:srgbClr val="000000"/>
                   </a:solidFill>
@@ -26306,7 +26331,7 @@
             </a:ln>
             <a:extLst>
               <a:ext uri="{91240B29-F687-4f45-9708-019B960494DF}">
-                <a14:hiddenLine xmlns="" xmlns:p14="http://schemas.microsoft.com/office/powerpoint/2010/main" xmlns:a14="http://schemas.microsoft.com/office/drawing/2010/main" w="9525">
+                <a14:hiddenLine xmlns:a14="http://schemas.microsoft.com/office/drawing/2010/main" xmlns:p14="http://schemas.microsoft.com/office/powerpoint/2010/main" xmlns="" w="9525">
                   <a:solidFill>
                     <a:srgbClr val="000000"/>
                   </a:solidFill>
@@ -26380,7 +26405,7 @@
             </a:ln>
             <a:extLst>
               <a:ext uri="{91240B29-F687-4f45-9708-019B960494DF}">
-                <a14:hiddenLine xmlns="" xmlns:p14="http://schemas.microsoft.com/office/powerpoint/2010/main" xmlns:a14="http://schemas.microsoft.com/office/drawing/2010/main" w="9525">
+                <a14:hiddenLine xmlns:a14="http://schemas.microsoft.com/office/drawing/2010/main" xmlns:p14="http://schemas.microsoft.com/office/powerpoint/2010/main" xmlns="" w="9525">
                   <a:solidFill>
                     <a:srgbClr val="000000"/>
                   </a:solidFill>
@@ -26454,7 +26479,7 @@
             </a:ln>
             <a:extLst>
               <a:ext uri="{91240B29-F687-4f45-9708-019B960494DF}">
-                <a14:hiddenLine xmlns="" xmlns:p14="http://schemas.microsoft.com/office/powerpoint/2010/main" xmlns:a14="http://schemas.microsoft.com/office/drawing/2010/main" w="9525">
+                <a14:hiddenLine xmlns:a14="http://schemas.microsoft.com/office/drawing/2010/main" xmlns:p14="http://schemas.microsoft.com/office/powerpoint/2010/main" xmlns="" w="9525">
                   <a:solidFill>
                     <a:srgbClr val="000000"/>
                   </a:solidFill>
@@ -26556,7 +26581,7 @@
             </a:ln>
             <a:extLst>
               <a:ext uri="{91240B29-F687-4f45-9708-019B960494DF}">
-                <a14:hiddenLine xmlns="" xmlns:p14="http://schemas.microsoft.com/office/powerpoint/2010/main" xmlns:a14="http://schemas.microsoft.com/office/drawing/2010/main" w="9525">
+                <a14:hiddenLine xmlns:a14="http://schemas.microsoft.com/office/drawing/2010/main" xmlns:p14="http://schemas.microsoft.com/office/powerpoint/2010/main" xmlns="" w="9525">
                   <a:solidFill>
                     <a:srgbClr val="000000"/>
                   </a:solidFill>
@@ -26658,7 +26683,7 @@
             </a:ln>
             <a:extLst>
               <a:ext uri="{91240B29-F687-4f45-9708-019B960494DF}">
-                <a14:hiddenLine xmlns="" xmlns:p14="http://schemas.microsoft.com/office/powerpoint/2010/main" xmlns:a14="http://schemas.microsoft.com/office/drawing/2010/main" w="9525">
+                <a14:hiddenLine xmlns:a14="http://schemas.microsoft.com/office/drawing/2010/main" xmlns:p14="http://schemas.microsoft.com/office/powerpoint/2010/main" xmlns="" w="9525">
                   <a:solidFill>
                     <a:srgbClr val="000000"/>
                   </a:solidFill>
@@ -26732,7 +26757,7 @@
             </a:ln>
             <a:extLst>
               <a:ext uri="{91240B29-F687-4f45-9708-019B960494DF}">
-                <a14:hiddenLine xmlns="" xmlns:p14="http://schemas.microsoft.com/office/powerpoint/2010/main" xmlns:a14="http://schemas.microsoft.com/office/drawing/2010/main" w="9525">
+                <a14:hiddenLine xmlns:a14="http://schemas.microsoft.com/office/drawing/2010/main" xmlns:p14="http://schemas.microsoft.com/office/powerpoint/2010/main" xmlns="" w="9525">
                   <a:solidFill>
                     <a:srgbClr val="000000"/>
                   </a:solidFill>
@@ -26854,7 +26879,7 @@
             </a:ln>
             <a:extLst>
               <a:ext uri="{91240B29-F687-4f45-9708-019B960494DF}">
-                <a14:hiddenLine xmlns="" xmlns:p14="http://schemas.microsoft.com/office/powerpoint/2010/main" xmlns:a14="http://schemas.microsoft.com/office/drawing/2010/main" w="9525">
+                <a14:hiddenLine xmlns:a14="http://schemas.microsoft.com/office/drawing/2010/main" xmlns:p14="http://schemas.microsoft.com/office/powerpoint/2010/main" xmlns="" w="9525">
                   <a:solidFill>
                     <a:srgbClr val="000000"/>
                   </a:solidFill>
@@ -26928,7 +26953,7 @@
             </a:ln>
             <a:extLst>
               <a:ext uri="{91240B29-F687-4f45-9708-019B960494DF}">
-                <a14:hiddenLine xmlns="" xmlns:p14="http://schemas.microsoft.com/office/powerpoint/2010/main" xmlns:a14="http://schemas.microsoft.com/office/drawing/2010/main" w="9525">
+                <a14:hiddenLine xmlns:a14="http://schemas.microsoft.com/office/drawing/2010/main" xmlns:p14="http://schemas.microsoft.com/office/powerpoint/2010/main" xmlns="" w="9525">
                   <a:solidFill>
                     <a:srgbClr val="000000"/>
                   </a:solidFill>
@@ -27030,7 +27055,7 @@
             </a:ln>
             <a:extLst>
               <a:ext uri="{91240B29-F687-4f45-9708-019B960494DF}">
-                <a14:hiddenLine xmlns="" xmlns:p14="http://schemas.microsoft.com/office/powerpoint/2010/main" xmlns:a14="http://schemas.microsoft.com/office/drawing/2010/main" w="9525">
+                <a14:hiddenLine xmlns:a14="http://schemas.microsoft.com/office/drawing/2010/main" xmlns:p14="http://schemas.microsoft.com/office/powerpoint/2010/main" xmlns="" w="9525">
                   <a:solidFill>
                     <a:srgbClr val="000000"/>
                   </a:solidFill>
@@ -27132,7 +27157,7 @@
             </a:ln>
             <a:extLst>
               <a:ext uri="{91240B29-F687-4f45-9708-019B960494DF}">
-                <a14:hiddenLine xmlns="" xmlns:p14="http://schemas.microsoft.com/office/powerpoint/2010/main" xmlns:a14="http://schemas.microsoft.com/office/drawing/2010/main" w="9525">
+                <a14:hiddenLine xmlns:a14="http://schemas.microsoft.com/office/drawing/2010/main" xmlns:p14="http://schemas.microsoft.com/office/powerpoint/2010/main" xmlns="" w="9525">
                   <a:solidFill>
                     <a:srgbClr val="000000"/>
                   </a:solidFill>
@@ -27206,7 +27231,7 @@
             </a:ln>
             <a:extLst>
               <a:ext uri="{91240B29-F687-4f45-9708-019B960494DF}">
-                <a14:hiddenLine xmlns="" xmlns:p14="http://schemas.microsoft.com/office/powerpoint/2010/main" xmlns:a14="http://schemas.microsoft.com/office/drawing/2010/main" w="9525">
+                <a14:hiddenLine xmlns:a14="http://schemas.microsoft.com/office/drawing/2010/main" xmlns:p14="http://schemas.microsoft.com/office/powerpoint/2010/main" xmlns="" w="9525">
                   <a:solidFill>
                     <a:srgbClr val="000000"/>
                   </a:solidFill>
@@ -27308,7 +27333,7 @@
             </a:ln>
             <a:extLst>
               <a:ext uri="{91240B29-F687-4f45-9708-019B960494DF}">
-                <a14:hiddenLine xmlns="" xmlns:p14="http://schemas.microsoft.com/office/powerpoint/2010/main" xmlns:a14="http://schemas.microsoft.com/office/drawing/2010/main" w="9525">
+                <a14:hiddenLine xmlns:a14="http://schemas.microsoft.com/office/drawing/2010/main" xmlns:p14="http://schemas.microsoft.com/office/powerpoint/2010/main" xmlns="" w="9525">
                   <a:solidFill>
                     <a:srgbClr val="000000"/>
                   </a:solidFill>
@@ -27410,7 +27435,7 @@
             </a:ln>
             <a:extLst>
               <a:ext uri="{91240B29-F687-4f45-9708-019B960494DF}">
-                <a14:hiddenLine xmlns="" xmlns:p14="http://schemas.microsoft.com/office/powerpoint/2010/main" xmlns:a14="http://schemas.microsoft.com/office/drawing/2010/main" w="9525">
+                <a14:hiddenLine xmlns:a14="http://schemas.microsoft.com/office/drawing/2010/main" xmlns:p14="http://schemas.microsoft.com/office/powerpoint/2010/main" xmlns="" w="9525">
                   <a:solidFill>
                     <a:srgbClr val="000000"/>
                   </a:solidFill>
@@ -27478,7 +27503,7 @@
             </a:ln>
             <a:extLst>
               <a:ext uri="{91240B29-F687-4f45-9708-019B960494DF}">
-                <a14:hiddenLine xmlns="" xmlns:p14="http://schemas.microsoft.com/office/powerpoint/2010/main" xmlns:a14="http://schemas.microsoft.com/office/drawing/2010/main" w="9525">
+                <a14:hiddenLine xmlns:a14="http://schemas.microsoft.com/office/drawing/2010/main" xmlns:p14="http://schemas.microsoft.com/office/powerpoint/2010/main" xmlns="" w="9525">
                   <a:solidFill>
                     <a:srgbClr val="000000"/>
                   </a:solidFill>
@@ -27580,7 +27605,7 @@
             </a:ln>
             <a:extLst>
               <a:ext uri="{91240B29-F687-4f45-9708-019B960494DF}">
-                <a14:hiddenLine xmlns="" xmlns:p14="http://schemas.microsoft.com/office/powerpoint/2010/main" xmlns:a14="http://schemas.microsoft.com/office/drawing/2010/main" w="9525">
+                <a14:hiddenLine xmlns:a14="http://schemas.microsoft.com/office/drawing/2010/main" xmlns:p14="http://schemas.microsoft.com/office/powerpoint/2010/main" xmlns="" w="9525">
                   <a:solidFill>
                     <a:srgbClr val="000000"/>
                   </a:solidFill>
@@ -27648,7 +27673,7 @@
             </a:ln>
             <a:extLst>
               <a:ext uri="{91240B29-F687-4f45-9708-019B960494DF}">
-                <a14:hiddenLine xmlns="" xmlns:p14="http://schemas.microsoft.com/office/powerpoint/2010/main" xmlns:a14="http://schemas.microsoft.com/office/drawing/2010/main" w="9525">
+                <a14:hiddenLine xmlns:a14="http://schemas.microsoft.com/office/drawing/2010/main" xmlns:p14="http://schemas.microsoft.com/office/powerpoint/2010/main" xmlns="" w="9525">
                   <a:solidFill>
                     <a:srgbClr val="000000"/>
                   </a:solidFill>
@@ -27750,7 +27775,7 @@
             </a:ln>
             <a:extLst>
               <a:ext uri="{91240B29-F687-4f45-9708-019B960494DF}">
-                <a14:hiddenLine xmlns="" xmlns:p14="http://schemas.microsoft.com/office/powerpoint/2010/main" xmlns:a14="http://schemas.microsoft.com/office/drawing/2010/main" w="9525">
+                <a14:hiddenLine xmlns:a14="http://schemas.microsoft.com/office/drawing/2010/main" xmlns:p14="http://schemas.microsoft.com/office/powerpoint/2010/main" xmlns="" w="9525">
                   <a:solidFill>
                     <a:srgbClr val="000000"/>
                   </a:solidFill>
@@ -27830,7 +27855,7 @@
             </a:ln>
             <a:extLst>
               <a:ext uri="{91240B29-F687-4f45-9708-019B960494DF}">
-                <a14:hiddenLine xmlns="" xmlns:p14="http://schemas.microsoft.com/office/powerpoint/2010/main" xmlns:a14="http://schemas.microsoft.com/office/drawing/2010/main" w="9525">
+                <a14:hiddenLine xmlns:a14="http://schemas.microsoft.com/office/drawing/2010/main" xmlns:p14="http://schemas.microsoft.com/office/powerpoint/2010/main" xmlns="" w="9525">
                   <a:solidFill>
                     <a:srgbClr val="000000"/>
                   </a:solidFill>
@@ -27932,7 +27957,7 @@
             </a:ln>
             <a:extLst>
               <a:ext uri="{91240B29-F687-4f45-9708-019B960494DF}">
-                <a14:hiddenLine xmlns="" xmlns:p14="http://schemas.microsoft.com/office/powerpoint/2010/main" xmlns:a14="http://schemas.microsoft.com/office/drawing/2010/main" w="9525">
+                <a14:hiddenLine xmlns:a14="http://schemas.microsoft.com/office/drawing/2010/main" xmlns:p14="http://schemas.microsoft.com/office/powerpoint/2010/main" xmlns="" w="9525">
                   <a:solidFill>
                     <a:srgbClr val="000000"/>
                   </a:solidFill>
@@ -28012,7 +28037,7 @@
             </a:ln>
             <a:extLst>
               <a:ext uri="{91240B29-F687-4f45-9708-019B960494DF}">
-                <a14:hiddenLine xmlns="" xmlns:p14="http://schemas.microsoft.com/office/powerpoint/2010/main" xmlns:a14="http://schemas.microsoft.com/office/drawing/2010/main" w="9525">
+                <a14:hiddenLine xmlns:a14="http://schemas.microsoft.com/office/drawing/2010/main" xmlns:p14="http://schemas.microsoft.com/office/powerpoint/2010/main" xmlns="" w="9525">
                   <a:solidFill>
                     <a:srgbClr val="000000"/>
                   </a:solidFill>
@@ -28114,7 +28139,7 @@
             </a:ln>
             <a:extLst>
               <a:ext uri="{91240B29-F687-4f45-9708-019B960494DF}">
-                <a14:hiddenLine xmlns="" xmlns:p14="http://schemas.microsoft.com/office/powerpoint/2010/main" xmlns:a14="http://schemas.microsoft.com/office/drawing/2010/main" w="9525">
+                <a14:hiddenLine xmlns:a14="http://schemas.microsoft.com/office/drawing/2010/main" xmlns:p14="http://schemas.microsoft.com/office/powerpoint/2010/main" xmlns="" w="9525">
                   <a:solidFill>
                     <a:srgbClr val="000000"/>
                   </a:solidFill>
@@ -28160,7 +28185,7 @@
             </a:ln>
             <a:extLst>
               <a:ext uri="{91240B29-F687-4f45-9708-019B960494DF}">
-                <a14:hiddenLine xmlns="" xmlns:p14="http://schemas.microsoft.com/office/powerpoint/2010/main" xmlns:a14="http://schemas.microsoft.com/office/drawing/2010/main" w="9525">
+                <a14:hiddenLine xmlns:a14="http://schemas.microsoft.com/office/drawing/2010/main" xmlns:p14="http://schemas.microsoft.com/office/powerpoint/2010/main" xmlns="" w="9525">
                   <a:solidFill>
                     <a:srgbClr val="000000"/>
                   </a:solidFill>
@@ -28262,7 +28287,7 @@
             </a:ln>
             <a:extLst>
               <a:ext uri="{91240B29-F687-4f45-9708-019B960494DF}">
-                <a14:hiddenLine xmlns="" xmlns:p14="http://schemas.microsoft.com/office/powerpoint/2010/main" xmlns:a14="http://schemas.microsoft.com/office/drawing/2010/main" w="9525">
+                <a14:hiddenLine xmlns:a14="http://schemas.microsoft.com/office/drawing/2010/main" xmlns:p14="http://schemas.microsoft.com/office/powerpoint/2010/main" xmlns="" w="9525">
                   <a:solidFill>
                     <a:srgbClr val="000000"/>
                   </a:solidFill>
@@ -28336,7 +28361,7 @@
             </a:ln>
             <a:extLst>
               <a:ext uri="{91240B29-F687-4f45-9708-019B960494DF}">
-                <a14:hiddenLine xmlns="" xmlns:p14="http://schemas.microsoft.com/office/powerpoint/2010/main" xmlns:a14="http://schemas.microsoft.com/office/drawing/2010/main" w="9525">
+                <a14:hiddenLine xmlns:a14="http://schemas.microsoft.com/office/drawing/2010/main" xmlns:p14="http://schemas.microsoft.com/office/powerpoint/2010/main" xmlns="" w="9525">
                   <a:solidFill>
                     <a:srgbClr val="000000"/>
                   </a:solidFill>
@@ -28410,7 +28435,7 @@
             </a:ln>
             <a:extLst>
               <a:ext uri="{91240B29-F687-4f45-9708-019B960494DF}">
-                <a14:hiddenLine xmlns="" xmlns:p14="http://schemas.microsoft.com/office/powerpoint/2010/main" xmlns:a14="http://schemas.microsoft.com/office/drawing/2010/main" w="9525">
+                <a14:hiddenLine xmlns:a14="http://schemas.microsoft.com/office/drawing/2010/main" xmlns:p14="http://schemas.microsoft.com/office/powerpoint/2010/main" xmlns="" w="9525">
                   <a:solidFill>
                     <a:srgbClr val="000000"/>
                   </a:solidFill>
@@ -28512,7 +28537,7 @@
             </a:ln>
             <a:extLst>
               <a:ext uri="{91240B29-F687-4f45-9708-019B960494DF}">
-                <a14:hiddenLine xmlns="" xmlns:p14="http://schemas.microsoft.com/office/powerpoint/2010/main" xmlns:a14="http://schemas.microsoft.com/office/drawing/2010/main" w="9525">
+                <a14:hiddenLine xmlns:a14="http://schemas.microsoft.com/office/drawing/2010/main" xmlns:p14="http://schemas.microsoft.com/office/powerpoint/2010/main" xmlns="" w="9525">
                   <a:solidFill>
                     <a:srgbClr val="000000"/>
                   </a:solidFill>
@@ -28592,7 +28617,7 @@
             </a:ln>
             <a:extLst>
               <a:ext uri="{91240B29-F687-4f45-9708-019B960494DF}">
-                <a14:hiddenLine xmlns="" xmlns:p14="http://schemas.microsoft.com/office/powerpoint/2010/main" xmlns:a14="http://schemas.microsoft.com/office/drawing/2010/main" w="9525">
+                <a14:hiddenLine xmlns:a14="http://schemas.microsoft.com/office/drawing/2010/main" xmlns:p14="http://schemas.microsoft.com/office/powerpoint/2010/main" xmlns="" w="9525">
                   <a:solidFill>
                     <a:srgbClr val="000000"/>
                   </a:solidFill>
@@ -28666,7 +28691,7 @@
             </a:ln>
             <a:extLst>
               <a:ext uri="{91240B29-F687-4f45-9708-019B960494DF}">
-                <a14:hiddenLine xmlns="" xmlns:p14="http://schemas.microsoft.com/office/powerpoint/2010/main" xmlns:a14="http://schemas.microsoft.com/office/drawing/2010/main" w="9525">
+                <a14:hiddenLine xmlns:a14="http://schemas.microsoft.com/office/drawing/2010/main" xmlns:p14="http://schemas.microsoft.com/office/powerpoint/2010/main" xmlns="" w="9525">
                   <a:solidFill>
                     <a:srgbClr val="000000"/>
                   </a:solidFill>
@@ -28768,7 +28793,7 @@
             </a:ln>
             <a:extLst>
               <a:ext uri="{91240B29-F687-4f45-9708-019B960494DF}">
-                <a14:hiddenLine xmlns="" xmlns:p14="http://schemas.microsoft.com/office/powerpoint/2010/main" xmlns:a14="http://schemas.microsoft.com/office/drawing/2010/main" w="9525">
+                <a14:hiddenLine xmlns:a14="http://schemas.microsoft.com/office/drawing/2010/main" xmlns:p14="http://schemas.microsoft.com/office/powerpoint/2010/main" xmlns="" w="9525">
                   <a:solidFill>
                     <a:srgbClr val="000000"/>
                   </a:solidFill>
@@ -28842,7 +28867,7 @@
             </a:ln>
             <a:extLst>
               <a:ext uri="{91240B29-F687-4f45-9708-019B960494DF}">
-                <a14:hiddenLine xmlns="" xmlns:p14="http://schemas.microsoft.com/office/powerpoint/2010/main" xmlns:a14="http://schemas.microsoft.com/office/drawing/2010/main" w="9525">
+                <a14:hiddenLine xmlns:a14="http://schemas.microsoft.com/office/drawing/2010/main" xmlns:p14="http://schemas.microsoft.com/office/powerpoint/2010/main" xmlns="" w="9525">
                   <a:solidFill>
                     <a:srgbClr val="000000"/>
                   </a:solidFill>
@@ -28944,7 +28969,7 @@
             </a:ln>
             <a:extLst>
               <a:ext uri="{91240B29-F687-4f45-9708-019B960494DF}">
-                <a14:hiddenLine xmlns="" xmlns:p14="http://schemas.microsoft.com/office/powerpoint/2010/main" xmlns:a14="http://schemas.microsoft.com/office/drawing/2010/main" w="9525">
+                <a14:hiddenLine xmlns:a14="http://schemas.microsoft.com/office/drawing/2010/main" xmlns:p14="http://schemas.microsoft.com/office/powerpoint/2010/main" xmlns="" w="9525">
                   <a:solidFill>
                     <a:srgbClr val="000000"/>
                   </a:solidFill>
@@ -29018,7 +29043,7 @@
             </a:ln>
             <a:extLst>
               <a:ext uri="{91240B29-F687-4f45-9708-019B960494DF}">
-                <a14:hiddenLine xmlns="" xmlns:p14="http://schemas.microsoft.com/office/powerpoint/2010/main" xmlns:a14="http://schemas.microsoft.com/office/drawing/2010/main" w="9525">
+                <a14:hiddenLine xmlns:a14="http://schemas.microsoft.com/office/drawing/2010/main" xmlns:p14="http://schemas.microsoft.com/office/powerpoint/2010/main" xmlns="" w="9525">
                   <a:solidFill>
                     <a:srgbClr val="000000"/>
                   </a:solidFill>
@@ -29120,7 +29145,7 @@
             </a:ln>
             <a:extLst>
               <a:ext uri="{91240B29-F687-4f45-9708-019B960494DF}">
-                <a14:hiddenLine xmlns="" xmlns:p14="http://schemas.microsoft.com/office/powerpoint/2010/main" xmlns:a14="http://schemas.microsoft.com/office/drawing/2010/main" w="9525">
+                <a14:hiddenLine xmlns:a14="http://schemas.microsoft.com/office/drawing/2010/main" xmlns:p14="http://schemas.microsoft.com/office/powerpoint/2010/main" xmlns="" w="9525">
                   <a:solidFill>
                     <a:srgbClr val="000000"/>
                   </a:solidFill>
@@ -29166,7 +29191,7 @@
             </a:ln>
             <a:extLst>
               <a:ext uri="{91240B29-F687-4f45-9708-019B960494DF}">
-                <a14:hiddenLine xmlns="" xmlns:p14="http://schemas.microsoft.com/office/powerpoint/2010/main" xmlns:a14="http://schemas.microsoft.com/office/drawing/2010/main" w="9525">
+                <a14:hiddenLine xmlns:a14="http://schemas.microsoft.com/office/drawing/2010/main" xmlns:p14="http://schemas.microsoft.com/office/powerpoint/2010/main" xmlns="" w="9525">
                   <a:solidFill>
                     <a:srgbClr val="000000"/>
                   </a:solidFill>
@@ -29243,7 +29268,7 @@
             </a:ln>
             <a:extLst>
               <a:ext uri="{91240B29-F687-4f45-9708-019B960494DF}">
-                <a14:hiddenLine xmlns="" xmlns:p14="http://schemas.microsoft.com/office/powerpoint/2010/main" xmlns:a14="http://schemas.microsoft.com/office/drawing/2010/main" w="9525">
+                <a14:hiddenLine xmlns:a14="http://schemas.microsoft.com/office/drawing/2010/main" xmlns:p14="http://schemas.microsoft.com/office/powerpoint/2010/main" xmlns="" w="9525">
                   <a:solidFill>
                     <a:srgbClr val="000000"/>
                   </a:solidFill>
@@ -29345,7 +29370,7 @@
             </a:ln>
             <a:extLst>
               <a:ext uri="{91240B29-F687-4f45-9708-019B960494DF}">
-                <a14:hiddenLine xmlns="" xmlns:p14="http://schemas.microsoft.com/office/powerpoint/2010/main" xmlns:a14="http://schemas.microsoft.com/office/drawing/2010/main" w="9525">
+                <a14:hiddenLine xmlns:a14="http://schemas.microsoft.com/office/drawing/2010/main" xmlns:p14="http://schemas.microsoft.com/office/powerpoint/2010/main" xmlns="" w="9525">
                   <a:solidFill>
                     <a:srgbClr val="000000"/>
                   </a:solidFill>
@@ -29419,7 +29444,7 @@
             </a:ln>
             <a:extLst>
               <a:ext uri="{91240B29-F687-4f45-9708-019B960494DF}">
-                <a14:hiddenLine xmlns="" xmlns:p14="http://schemas.microsoft.com/office/powerpoint/2010/main" xmlns:a14="http://schemas.microsoft.com/office/drawing/2010/main" w="9525">
+                <a14:hiddenLine xmlns:a14="http://schemas.microsoft.com/office/drawing/2010/main" xmlns:p14="http://schemas.microsoft.com/office/powerpoint/2010/main" xmlns="" w="9525">
                   <a:solidFill>
                     <a:srgbClr val="000000"/>
                   </a:solidFill>
@@ -29521,7 +29546,7 @@
             </a:ln>
             <a:extLst>
               <a:ext uri="{91240B29-F687-4f45-9708-019B960494DF}">
-                <a14:hiddenLine xmlns="" xmlns:p14="http://schemas.microsoft.com/office/powerpoint/2010/main" xmlns:a14="http://schemas.microsoft.com/office/drawing/2010/main" w="9525">
+                <a14:hiddenLine xmlns:a14="http://schemas.microsoft.com/office/drawing/2010/main" xmlns:p14="http://schemas.microsoft.com/office/powerpoint/2010/main" xmlns="" w="9525">
                   <a:solidFill>
                     <a:srgbClr val="000000"/>
                   </a:solidFill>
@@ -29623,7 +29648,7 @@
             </a:ln>
             <a:extLst>
               <a:ext uri="{91240B29-F687-4f45-9708-019B960494DF}">
-                <a14:hiddenLine xmlns="" xmlns:p14="http://schemas.microsoft.com/office/powerpoint/2010/main" xmlns:a14="http://schemas.microsoft.com/office/drawing/2010/main" w="9525">
+                <a14:hiddenLine xmlns:a14="http://schemas.microsoft.com/office/drawing/2010/main" xmlns:p14="http://schemas.microsoft.com/office/powerpoint/2010/main" xmlns="" w="9525">
                   <a:solidFill>
                     <a:srgbClr val="000000"/>
                   </a:solidFill>
@@ -29700,7 +29725,7 @@
             </a:ln>
             <a:extLst>
               <a:ext uri="{91240B29-F687-4f45-9708-019B960494DF}">
-                <a14:hiddenLine xmlns="" xmlns:p14="http://schemas.microsoft.com/office/powerpoint/2010/main" xmlns:a14="http://schemas.microsoft.com/office/drawing/2010/main" w="9525">
+                <a14:hiddenLine xmlns:a14="http://schemas.microsoft.com/office/drawing/2010/main" xmlns:p14="http://schemas.microsoft.com/office/powerpoint/2010/main" xmlns="" w="9525">
                   <a:solidFill>
                     <a:srgbClr val="000000"/>
                   </a:solidFill>
@@ -29774,7 +29799,7 @@
             </a:ln>
             <a:extLst>
               <a:ext uri="{91240B29-F687-4f45-9708-019B960494DF}">
-                <a14:hiddenLine xmlns="" xmlns:p14="http://schemas.microsoft.com/office/powerpoint/2010/main" xmlns:a14="http://schemas.microsoft.com/office/drawing/2010/main" w="9525">
+                <a14:hiddenLine xmlns:a14="http://schemas.microsoft.com/office/drawing/2010/main" xmlns:p14="http://schemas.microsoft.com/office/powerpoint/2010/main" xmlns="" w="9525">
                   <a:solidFill>
                     <a:srgbClr val="000000"/>
                   </a:solidFill>
@@ -29876,7 +29901,7 @@
             </a:ln>
             <a:extLst>
               <a:ext uri="{91240B29-F687-4f45-9708-019B960494DF}">
-                <a14:hiddenLine xmlns="" xmlns:p14="http://schemas.microsoft.com/office/powerpoint/2010/main" xmlns:a14="http://schemas.microsoft.com/office/drawing/2010/main" w="9525">
+                <a14:hiddenLine xmlns:a14="http://schemas.microsoft.com/office/drawing/2010/main" xmlns:p14="http://schemas.microsoft.com/office/powerpoint/2010/main" xmlns="" w="9525">
                   <a:solidFill>
                     <a:srgbClr val="000000"/>
                   </a:solidFill>
@@ -29978,7 +30003,7 @@
             </a:ln>
             <a:extLst>
               <a:ext uri="{91240B29-F687-4f45-9708-019B960494DF}">
-                <a14:hiddenLine xmlns="" xmlns:p14="http://schemas.microsoft.com/office/powerpoint/2010/main" xmlns:a14="http://schemas.microsoft.com/office/drawing/2010/main" w="9525">
+                <a14:hiddenLine xmlns:a14="http://schemas.microsoft.com/office/drawing/2010/main" xmlns:p14="http://schemas.microsoft.com/office/powerpoint/2010/main" xmlns="" w="9525">
                   <a:solidFill>
                     <a:srgbClr val="000000"/>
                   </a:solidFill>
@@ -30052,7 +30077,7 @@
             </a:ln>
             <a:extLst>
               <a:ext uri="{91240B29-F687-4f45-9708-019B960494DF}">
-                <a14:hiddenLine xmlns="" xmlns:p14="http://schemas.microsoft.com/office/powerpoint/2010/main" xmlns:a14="http://schemas.microsoft.com/office/drawing/2010/main" w="9525">
+                <a14:hiddenLine xmlns:a14="http://schemas.microsoft.com/office/drawing/2010/main" xmlns:p14="http://schemas.microsoft.com/office/powerpoint/2010/main" xmlns="" w="9525">
                   <a:solidFill>
                     <a:srgbClr val="000000"/>
                   </a:solidFill>
@@ -30184,7 +30209,7 @@
             </a:ln>
             <a:extLst>
               <a:ext uri="{91240B29-F687-4f45-9708-019B960494DF}">
-                <a14:hiddenLine xmlns="" xmlns:p14="http://schemas.microsoft.com/office/powerpoint/2010/main" xmlns:a14="http://schemas.microsoft.com/office/drawing/2010/main" w="9525">
+                <a14:hiddenLine xmlns:a14="http://schemas.microsoft.com/office/drawing/2010/main" xmlns:p14="http://schemas.microsoft.com/office/powerpoint/2010/main" xmlns="" w="9525">
                   <a:solidFill>
                     <a:srgbClr val="000000"/>
                   </a:solidFill>
@@ -30264,7 +30289,7 @@
             </a:ln>
             <a:extLst>
               <a:ext uri="{91240B29-F687-4f45-9708-019B960494DF}">
-                <a14:hiddenLine xmlns="" xmlns:p14="http://schemas.microsoft.com/office/powerpoint/2010/main" xmlns:a14="http://schemas.microsoft.com/office/drawing/2010/main" w="9525">
+                <a14:hiddenLine xmlns:a14="http://schemas.microsoft.com/office/drawing/2010/main" xmlns:p14="http://schemas.microsoft.com/office/powerpoint/2010/main" xmlns="" w="9525">
                   <a:solidFill>
                     <a:srgbClr val="000000"/>
                   </a:solidFill>
@@ -30366,7 +30391,7 @@
             </a:ln>
             <a:extLst>
               <a:ext uri="{91240B29-F687-4f45-9708-019B960494DF}">
-                <a14:hiddenLine xmlns="" xmlns:p14="http://schemas.microsoft.com/office/powerpoint/2010/main" xmlns:a14="http://schemas.microsoft.com/office/drawing/2010/main" w="9525">
+                <a14:hiddenLine xmlns:a14="http://schemas.microsoft.com/office/drawing/2010/main" xmlns:p14="http://schemas.microsoft.com/office/powerpoint/2010/main" xmlns="" w="9525">
                   <a:solidFill>
                     <a:srgbClr val="000000"/>
                   </a:solidFill>
@@ -30559,10 +30584,165 @@
         </p:nvSpPr>
         <p:spPr/>
         <p:txBody>
-          <a:bodyPr/>
+          <a:bodyPr>
+            <a:normAutofit fontScale="47500" lnSpcReduction="20000"/>
+          </a:bodyPr>
           <a:lstStyle/>
           <a:p>
-            <a:endParaRPr lang="en-US"/>
+            <a:r>
+              <a:rPr lang="en-US" dirty="0"/>
+              <a:t>Cho, Adrian. 2014. “Quantum or Not, Controversial Computer Yields No Speedup.” </a:t>
+            </a:r>
+            <a:r>
+              <a:rPr lang="en-US" i="1" dirty="0"/>
+              <a:t>Science</a:t>
+            </a:r>
+            <a:r>
+              <a:rPr lang="en-US" dirty="0"/>
+              <a:t> 344 (6190): 1330–31. </a:t>
+            </a:r>
+            <a:r>
+              <a:rPr lang="en-US" dirty="0">
+                <a:hlinkClick r:id="rId2"/>
+              </a:rPr>
+              <a:t>https://doi.org/10.1126/science.344.6190.1330</a:t>
+            </a:r>
+            <a:r>
+              <a:rPr lang="en-US" dirty="0"/>
+              <a:t>.</a:t>
+            </a:r>
+          </a:p>
+          <a:p>
+            <a:r>
+              <a:rPr lang="en-US" dirty="0" err="1"/>
+              <a:t>Greenemeier</a:t>
+            </a:r>
+            <a:r>
+              <a:rPr lang="en-US" dirty="0"/>
+              <a:t>, Larry. n.d. “Election Fix? Switzerland Tests Quantum Cryptography.” Scientific American. Accessed April 24, 2018. </a:t>
+            </a:r>
+            <a:r>
+              <a:rPr lang="en-US" dirty="0">
+                <a:hlinkClick r:id="rId3"/>
+              </a:rPr>
+              <a:t>https://www.scientificamerican.com/article/swiss-test-quantum-cryptography/</a:t>
+            </a:r>
+            <a:r>
+              <a:rPr lang="en-US" dirty="0"/>
+              <a:t>.</a:t>
+            </a:r>
+          </a:p>
+          <a:p>
+            <a:r>
+              <a:rPr lang="en-US" dirty="0"/>
+              <a:t>Hernandez, Paul. 2015. “Getting Better All the Time: JILA Strontium Atomic Clock Sets New Records.” Text. NIST. April 21, 2015. </a:t>
+            </a:r>
+            <a:r>
+              <a:rPr lang="en-US" dirty="0">
+                <a:hlinkClick r:id="rId4"/>
+              </a:rPr>
+              <a:t>https://www.nist.gov/news-events/news/2015/04/getting-better-all-time-jila-strontium-atomic-clock-sets-new-records</a:t>
+            </a:r>
+            <a:r>
+              <a:rPr lang="en-US" dirty="0"/>
+              <a:t>.</a:t>
+            </a:r>
+          </a:p>
+          <a:p>
+            <a:r>
+              <a:rPr lang="en-US" dirty="0"/>
+              <a:t>Jenner, Nicola. n.d. “Five Practical Uses for ‘Spooky’ Quantum Mechanics.” Smithsonian. Accessed April 22, 2018. </a:t>
+            </a:r>
+            <a:r>
+              <a:rPr lang="en-US" dirty="0">
+                <a:hlinkClick r:id="rId5"/>
+              </a:rPr>
+              <a:t>https://www.smithsonianmag.com/science-nature/five-practical-uses-spooky-quantum-mechanics-180953494/</a:t>
+            </a:r>
+            <a:r>
+              <a:rPr lang="en-US" dirty="0"/>
+              <a:t>.</a:t>
+            </a:r>
+          </a:p>
+          <a:p>
+            <a:r>
+              <a:rPr lang="en-US" dirty="0"/>
+              <a:t>Knight, Will. n.d. “Entangled Photons Secure Money Transfer.” New Scientist. Accessed April 24, 2018. </a:t>
+            </a:r>
+            <a:r>
+              <a:rPr lang="en-US" dirty="0">
+                <a:hlinkClick r:id="rId6"/>
+              </a:rPr>
+              <a:t>https://www.newscientist.com/article/dn4914-entangled-photons-secure-money-transfer/</a:t>
+            </a:r>
+            <a:r>
+              <a:rPr lang="en-US" dirty="0"/>
+              <a:t>.</a:t>
+            </a:r>
+          </a:p>
+          <a:p>
+            <a:r>
+              <a:rPr lang="en-US" dirty="0"/>
+              <a:t>Ma, Xiao-Song, Thomas Herbst, Thomas </a:t>
+            </a:r>
+            <a:r>
+              <a:rPr lang="en-US" dirty="0" err="1"/>
+              <a:t>Scheidl</a:t>
+            </a:r>
+            <a:r>
+              <a:rPr lang="en-US" dirty="0"/>
+              <a:t>, Daqing Wang, Sebastian </a:t>
+            </a:r>
+            <a:r>
+              <a:rPr lang="en-US" dirty="0" err="1"/>
+              <a:t>Kropatschek</a:t>
+            </a:r>
+            <a:r>
+              <a:rPr lang="en-US" dirty="0"/>
+              <a:t>, William Naylor, Bernhard Wittmann, et al. 2012. “Quantum Teleportation over 143 </a:t>
+            </a:r>
+            <a:r>
+              <a:rPr lang="en-US" dirty="0" err="1"/>
+              <a:t>Kilometres</a:t>
+            </a:r>
+            <a:r>
+              <a:rPr lang="en-US" dirty="0"/>
+              <a:t> Using Active Feed-Forward.” </a:t>
+            </a:r>
+            <a:r>
+              <a:rPr lang="en-US" i="1" dirty="0"/>
+              <a:t>Nature</a:t>
+            </a:r>
+            <a:r>
+              <a:rPr lang="en-US" dirty="0"/>
+              <a:t> 489 (7415): 269–73. </a:t>
+            </a:r>
+            <a:r>
+              <a:rPr lang="en-US" dirty="0">
+                <a:hlinkClick r:id="rId7"/>
+              </a:rPr>
+              <a:t>https://doi.org/10.1038/nature11472</a:t>
+            </a:r>
+            <a:r>
+              <a:rPr lang="en-US" dirty="0"/>
+              <a:t>.</a:t>
+            </a:r>
+          </a:p>
+          <a:p>
+            <a:r>
+              <a:rPr lang="en-US" dirty="0"/>
+              <a:t>Woodford, Chris. n.d. “How Quartz Watches and Clocks Work.” Explain That Stuff. Accessed April 24, 2018. </a:t>
+            </a:r>
+            <a:r>
+              <a:rPr lang="en-US" dirty="0">
+                <a:hlinkClick r:id="rId8"/>
+              </a:rPr>
+              <a:t>http://www.explainthatstuff.com/quartzclockwatch.html</a:t>
+            </a:r>
+            <a:r>
+              <a:rPr lang="en-US" dirty="0"/>
+              <a:t>.</a:t>
+            </a:r>
           </a:p>
         </p:txBody>
       </p:sp>
@@ -30619,7 +30799,7 @@
           <a:p>
             <a:r>
               <a:rPr lang="en-US" dirty="0"/>
-              <a:t>Quantum Jump</a:t>
+              <a:t>Atomic Energy Levels</a:t>
             </a:r>
           </a:p>
         </p:txBody>
@@ -30647,8 +30827,33 @@
           <a:p>
             <a:r>
               <a:rPr lang="en-US" dirty="0"/>
-              <a:t>Electrons in an atom jump between energy levels, absorbing or emitting a photon</a:t>
+              <a:t>Electrons in an atom jump between energy levels</a:t>
             </a:r>
+          </a:p>
+          <a:p>
+            <a:r>
+              <a:rPr lang="en-US" dirty="0"/>
+              <a:t>A photon is absorbed when jumping to a higher energy level</a:t>
+            </a:r>
+          </a:p>
+          <a:p>
+            <a:r>
+              <a:rPr lang="en-US" dirty="0"/>
+              <a:t>A photon is emitted when dropping to a lower energy level</a:t>
+            </a:r>
+          </a:p>
+          <a:p>
+            <a:r>
+              <a:rPr lang="en-US" dirty="0"/>
+              <a:t>The photon’s energy must be equal to the difference in </a:t>
+            </a:r>
+            <a:r>
+              <a:rPr lang="en-US"/>
+              <a:t>energy levels</a:t>
+            </a:r>
+          </a:p>
+          <a:p>
+            <a:endParaRPr lang="en-US" dirty="0"/>
           </a:p>
         </p:txBody>
       </p:sp>

</xml_diff>